<commit_message>
Allowed filepath parameter, and fixed provider info
</commit_message>
<xml_diff>
--- a/AI_Engine/Info/ExtraccionDatos.pptx
+++ b/AI_Engine/Info/ExtraccionDatos.pptx
@@ -235,7 +235,7 @@
   <pc:docChgLst>
     <pc:chgData name="Gonzalez Diaz Sergio" userId="dac0d5b6-ec0d-43f8-830d-6804c08729bd" providerId="ADAL" clId="{66F5617D-744B-4ECE-AD14-49747398F09F}"/>
     <pc:docChg chg="undo custSel modSld modMainMaster">
-      <pc:chgData name="Gonzalez Diaz Sergio" userId="dac0d5b6-ec0d-43f8-830d-6804c08729bd" providerId="ADAL" clId="{66F5617D-744B-4ECE-AD14-49747398F09F}" dt="2022-04-07T09:53:19.542" v="291"/>
+      <pc:chgData name="Gonzalez Diaz Sergio" userId="dac0d5b6-ec0d-43f8-830d-6804c08729bd" providerId="ADAL" clId="{66F5617D-744B-4ECE-AD14-49747398F09F}" dt="2022-05-05T11:32:47.390" v="323" actId="1037"/>
       <pc:docMkLst>
         <pc:docMk/>
       </pc:docMkLst>
@@ -756,13 +756,13 @@
         </pc:picChg>
       </pc:sldChg>
       <pc:sldChg chg="addSp delSp modSp mod">
-        <pc:chgData name="Gonzalez Diaz Sergio" userId="dac0d5b6-ec0d-43f8-830d-6804c08729bd" providerId="ADAL" clId="{66F5617D-744B-4ECE-AD14-49747398F09F}" dt="2022-04-06T14:43:13.158" v="281"/>
+        <pc:chgData name="Gonzalez Diaz Sergio" userId="dac0d5b6-ec0d-43f8-830d-6804c08729bd" providerId="ADAL" clId="{66F5617D-744B-4ECE-AD14-49747398F09F}" dt="2022-05-05T11:32:47.390" v="323" actId="1037"/>
         <pc:sldMkLst>
           <pc:docMk/>
           <pc:sldMk cId="1453104656" sldId="269"/>
         </pc:sldMkLst>
         <pc:spChg chg="mod">
-          <ac:chgData name="Gonzalez Diaz Sergio" userId="dac0d5b6-ec0d-43f8-830d-6804c08729bd" providerId="ADAL" clId="{66F5617D-744B-4ECE-AD14-49747398F09F}" dt="2022-03-16T10:26:25.706" v="147" actId="1076"/>
+          <ac:chgData name="Gonzalez Diaz Sergio" userId="dac0d5b6-ec0d-43f8-830d-6804c08729bd" providerId="ADAL" clId="{66F5617D-744B-4ECE-AD14-49747398F09F}" dt="2022-05-05T11:32:47.390" v="323" actId="1037"/>
           <ac:spMkLst>
             <pc:docMk/>
             <pc:sldMk cId="1453104656" sldId="269"/>
@@ -1260,7 +1260,7 @@
           <a:p>
             <a:fld id="{0C61CF30-DE61-461E-AAC4-6E49BA39EF82}" type="datetimeFigureOut">
               <a:rPr lang="en-US" smtClean="0"/>
-              <a:t>4/7/2022</a:t>
+              <a:t>5/5/2022</a:t>
             </a:fld>
             <a:endParaRPr lang="en-US"/>
           </a:p>
@@ -1674,7 +1674,7 @@
           <a:p>
             <a:fld id="{5D2372E6-3DEE-4B43-ADE9-D3CE0FEDAA57}" type="datetimeFigureOut">
               <a:rPr lang="en-US" smtClean="0"/>
-              <a:t>4/7/2022</a:t>
+              <a:t>5/5/2022</a:t>
             </a:fld>
             <a:endParaRPr lang="en-US"/>
           </a:p>
@@ -1872,7 +1872,7 @@
           <a:p>
             <a:fld id="{5D2372E6-3DEE-4B43-ADE9-D3CE0FEDAA57}" type="datetimeFigureOut">
               <a:rPr lang="en-US" smtClean="0"/>
-              <a:t>4/7/2022</a:t>
+              <a:t>5/5/2022</a:t>
             </a:fld>
             <a:endParaRPr lang="en-US"/>
           </a:p>
@@ -2080,7 +2080,7 @@
           <a:p>
             <a:fld id="{5D2372E6-3DEE-4B43-ADE9-D3CE0FEDAA57}" type="datetimeFigureOut">
               <a:rPr lang="en-US" smtClean="0"/>
-              <a:t>4/7/2022</a:t>
+              <a:t>5/5/2022</a:t>
             </a:fld>
             <a:endParaRPr lang="en-US"/>
           </a:p>
@@ -2278,7 +2278,7 @@
           <a:p>
             <a:fld id="{5D2372E6-3DEE-4B43-ADE9-D3CE0FEDAA57}" type="datetimeFigureOut">
               <a:rPr lang="en-US" smtClean="0"/>
-              <a:t>4/7/2022</a:t>
+              <a:t>5/5/2022</a:t>
             </a:fld>
             <a:endParaRPr lang="en-US"/>
           </a:p>
@@ -2553,7 +2553,7 @@
           <a:p>
             <a:fld id="{5D2372E6-3DEE-4B43-ADE9-D3CE0FEDAA57}" type="datetimeFigureOut">
               <a:rPr lang="en-US" smtClean="0"/>
-              <a:t>4/7/2022</a:t>
+              <a:t>5/5/2022</a:t>
             </a:fld>
             <a:endParaRPr lang="en-US"/>
           </a:p>
@@ -2818,7 +2818,7 @@
           <a:p>
             <a:fld id="{5D2372E6-3DEE-4B43-ADE9-D3CE0FEDAA57}" type="datetimeFigureOut">
               <a:rPr lang="en-US" smtClean="0"/>
-              <a:t>4/7/2022</a:t>
+              <a:t>5/5/2022</a:t>
             </a:fld>
             <a:endParaRPr lang="en-US"/>
           </a:p>
@@ -3230,7 +3230,7 @@
           <a:p>
             <a:fld id="{5D2372E6-3DEE-4B43-ADE9-D3CE0FEDAA57}" type="datetimeFigureOut">
               <a:rPr lang="en-US" smtClean="0"/>
-              <a:t>4/7/2022</a:t>
+              <a:t>5/5/2022</a:t>
             </a:fld>
             <a:endParaRPr lang="en-US"/>
           </a:p>
@@ -3371,7 +3371,7 @@
           <a:p>
             <a:fld id="{5D2372E6-3DEE-4B43-ADE9-D3CE0FEDAA57}" type="datetimeFigureOut">
               <a:rPr lang="en-US" smtClean="0"/>
-              <a:t>4/7/2022</a:t>
+              <a:t>5/5/2022</a:t>
             </a:fld>
             <a:endParaRPr lang="en-US"/>
           </a:p>
@@ -3484,7 +3484,7 @@
           <a:p>
             <a:fld id="{5D2372E6-3DEE-4B43-ADE9-D3CE0FEDAA57}" type="datetimeFigureOut">
               <a:rPr lang="en-US" smtClean="0"/>
-              <a:t>4/7/2022</a:t>
+              <a:t>5/5/2022</a:t>
             </a:fld>
             <a:endParaRPr lang="en-US"/>
           </a:p>
@@ -3795,7 +3795,7 @@
           <a:p>
             <a:fld id="{5D2372E6-3DEE-4B43-ADE9-D3CE0FEDAA57}" type="datetimeFigureOut">
               <a:rPr lang="en-US" smtClean="0"/>
-              <a:t>4/7/2022</a:t>
+              <a:t>5/5/2022</a:t>
             </a:fld>
             <a:endParaRPr lang="en-US"/>
           </a:p>
@@ -4083,7 +4083,7 @@
           <a:p>
             <a:fld id="{5D2372E6-3DEE-4B43-ADE9-D3CE0FEDAA57}" type="datetimeFigureOut">
               <a:rPr lang="en-US" smtClean="0"/>
-              <a:t>4/7/2022</a:t>
+              <a:t>5/5/2022</a:t>
             </a:fld>
             <a:endParaRPr lang="en-US"/>
           </a:p>
@@ -4324,7 +4324,7 @@
           <a:p>
             <a:fld id="{5D2372E6-3DEE-4B43-ADE9-D3CE0FEDAA57}" type="datetimeFigureOut">
               <a:rPr lang="en-US" smtClean="0"/>
-              <a:t>4/7/2022</a:t>
+              <a:t>5/5/2022</a:t>
             </a:fld>
             <a:endParaRPr lang="en-US"/>
           </a:p>
@@ -11621,7 +11621,7 @@
         </p:nvSpPr>
         <p:spPr>
           <a:xfrm>
-            <a:off x="4491349" y="2321363"/>
+            <a:off x="3602349" y="2321363"/>
             <a:ext cx="371796" cy="140378"/>
           </a:xfrm>
           <a:prstGeom prst="rect">

</xml_diff>

<commit_message>
Arreglo bug Engine Power Components y actualizacion PowerPoint ExtraccionDatos
</commit_message>
<xml_diff>
--- a/AI_Engine/Info/ExtraccionDatos.pptx
+++ b/AI_Engine/Info/ExtraccionDatos.pptx
@@ -220,14 +220,6 @@
     </p:extLst>
   </p:cmAuthor>
 </p:cmAuthorLst>
-</file>
-
-<file path=ppt/revisionInfo.xml><?xml version="1.0" encoding="utf-8"?>
-<p1510:revInfo xmlns:a="http://schemas.openxmlformats.org/drawingml/2006/main" xmlns:r="http://schemas.openxmlformats.org/officeDocument/2006/relationships" xmlns:p1510="http://schemas.microsoft.com/office/powerpoint/2015/10/main">
-  <p1510:revLst>
-    <p1510:client id="{66F5617D-744B-4ECE-AD14-49747398F09F}" v="4" dt="2022-03-03T12:47:36.773"/>
-  </p1510:revLst>
-</p1510:revInfo>
 </file>
 
 <file path=ppt/changesInfos/changesInfo1.xml><?xml version="1.0" encoding="utf-8"?>
@@ -1175,6 +1167,327 @@
       </pc:sldMasterChg>
     </pc:docChg>
   </pc:docChgLst>
+  <pc:docChgLst>
+    <pc:chgData name="Gonzalez Diaz Sergio" userId="dac0d5b6-ec0d-43f8-830d-6804c08729bd" providerId="ADAL" clId="{B1F265F3-D2DB-416F-98D8-CC76CD68F08B}"/>
+    <pc:docChg chg="custSel modSld">
+      <pc:chgData name="Gonzalez Diaz Sergio" userId="dac0d5b6-ec0d-43f8-830d-6804c08729bd" providerId="ADAL" clId="{B1F265F3-D2DB-416F-98D8-CC76CD68F08B}" dt="2022-05-13T10:01:09.515" v="84"/>
+      <pc:docMkLst>
+        <pc:docMk/>
+      </pc:docMkLst>
+      <pc:sldChg chg="addSp modSp mod">
+        <pc:chgData name="Gonzalez Diaz Sergio" userId="dac0d5b6-ec0d-43f8-830d-6804c08729bd" providerId="ADAL" clId="{B1F265F3-D2DB-416F-98D8-CC76CD68F08B}" dt="2022-05-13T09:53:08.046" v="20" actId="1076"/>
+        <pc:sldMkLst>
+          <pc:docMk/>
+          <pc:sldMk cId="238053348" sldId="256"/>
+        </pc:sldMkLst>
+        <pc:spChg chg="add mod">
+          <ac:chgData name="Gonzalez Diaz Sergio" userId="dac0d5b6-ec0d-43f8-830d-6804c08729bd" providerId="ADAL" clId="{B1F265F3-D2DB-416F-98D8-CC76CD68F08B}" dt="2022-05-13T09:53:08.046" v="20" actId="1076"/>
+          <ac:spMkLst>
+            <pc:docMk/>
+            <pc:sldMk cId="238053348" sldId="256"/>
+            <ac:spMk id="2" creationId="{F9E1EBAB-24B4-4FFF-BEAB-BFDC4AEC6CCB}"/>
+          </ac:spMkLst>
+        </pc:spChg>
+      </pc:sldChg>
+      <pc:sldChg chg="addSp modSp">
+        <pc:chgData name="Gonzalez Diaz Sergio" userId="dac0d5b6-ec0d-43f8-830d-6804c08729bd" providerId="ADAL" clId="{B1F265F3-D2DB-416F-98D8-CC76CD68F08B}" dt="2022-05-13T09:53:11.192" v="21"/>
+        <pc:sldMkLst>
+          <pc:docMk/>
+          <pc:sldMk cId="3110176351" sldId="258"/>
+        </pc:sldMkLst>
+        <pc:spChg chg="add mod">
+          <ac:chgData name="Gonzalez Diaz Sergio" userId="dac0d5b6-ec0d-43f8-830d-6804c08729bd" providerId="ADAL" clId="{B1F265F3-D2DB-416F-98D8-CC76CD68F08B}" dt="2022-05-13T09:53:11.192" v="21"/>
+          <ac:spMkLst>
+            <pc:docMk/>
+            <pc:sldMk cId="3110176351" sldId="258"/>
+            <ac:spMk id="12" creationId="{80730CAE-802C-4708-95F8-903DDC0880F2}"/>
+          </ac:spMkLst>
+        </pc:spChg>
+      </pc:sldChg>
+      <pc:sldChg chg="addSp modSp mod">
+        <pc:chgData name="Gonzalez Diaz Sergio" userId="dac0d5b6-ec0d-43f8-830d-6804c08729bd" providerId="ADAL" clId="{B1F265F3-D2DB-416F-98D8-CC76CD68F08B}" dt="2022-05-13T09:55:27.485" v="39" actId="207"/>
+        <pc:sldMkLst>
+          <pc:docMk/>
+          <pc:sldMk cId="2854557906" sldId="259"/>
+        </pc:sldMkLst>
+        <pc:spChg chg="add mod">
+          <ac:chgData name="Gonzalez Diaz Sergio" userId="dac0d5b6-ec0d-43f8-830d-6804c08729bd" providerId="ADAL" clId="{B1F265F3-D2DB-416F-98D8-CC76CD68F08B}" dt="2022-05-13T09:55:27.485" v="39" actId="207"/>
+          <ac:spMkLst>
+            <pc:docMk/>
+            <pc:sldMk cId="2854557906" sldId="259"/>
+            <ac:spMk id="15" creationId="{92013717-84DF-4DD1-A75F-41DA45B60F7C}"/>
+          </ac:spMkLst>
+        </pc:spChg>
+      </pc:sldChg>
+      <pc:sldChg chg="addSp modSp mod">
+        <pc:chgData name="Gonzalez Diaz Sergio" userId="dac0d5b6-ec0d-43f8-830d-6804c08729bd" providerId="ADAL" clId="{B1F265F3-D2DB-416F-98D8-CC76CD68F08B}" dt="2022-05-13T09:55:56.300" v="60" actId="20577"/>
+        <pc:sldMkLst>
+          <pc:docMk/>
+          <pc:sldMk cId="3181673949" sldId="260"/>
+        </pc:sldMkLst>
+        <pc:spChg chg="add mod">
+          <ac:chgData name="Gonzalez Diaz Sergio" userId="dac0d5b6-ec0d-43f8-830d-6804c08729bd" providerId="ADAL" clId="{B1F265F3-D2DB-416F-98D8-CC76CD68F08B}" dt="2022-05-13T09:55:56.300" v="60" actId="20577"/>
+          <ac:spMkLst>
+            <pc:docMk/>
+            <pc:sldMk cId="3181673949" sldId="260"/>
+            <ac:spMk id="38" creationId="{F2B3F7D9-1A06-44AF-9ED0-1BFF58ECEDFE}"/>
+          </ac:spMkLst>
+        </pc:spChg>
+      </pc:sldChg>
+      <pc:sldChg chg="addSp modSp mod">
+        <pc:chgData name="Gonzalez Diaz Sergio" userId="dac0d5b6-ec0d-43f8-830d-6804c08729bd" providerId="ADAL" clId="{B1F265F3-D2DB-416F-98D8-CC76CD68F08B}" dt="2022-05-13T09:56:52.842" v="67" actId="20577"/>
+        <pc:sldMkLst>
+          <pc:docMk/>
+          <pc:sldMk cId="934720096" sldId="261"/>
+        </pc:sldMkLst>
+        <pc:spChg chg="add mod">
+          <ac:chgData name="Gonzalez Diaz Sergio" userId="dac0d5b6-ec0d-43f8-830d-6804c08729bd" providerId="ADAL" clId="{B1F265F3-D2DB-416F-98D8-CC76CD68F08B}" dt="2022-05-13T09:56:52.842" v="67" actId="20577"/>
+          <ac:spMkLst>
+            <pc:docMk/>
+            <pc:sldMk cId="934720096" sldId="261"/>
+            <ac:spMk id="9" creationId="{BB415FAF-9663-4C3B-9ECD-8A8F669052EB}"/>
+          </ac:spMkLst>
+        </pc:spChg>
+      </pc:sldChg>
+      <pc:sldChg chg="addSp delSp modSp mod">
+        <pc:chgData name="Gonzalez Diaz Sergio" userId="dac0d5b6-ec0d-43f8-830d-6804c08729bd" providerId="ADAL" clId="{B1F265F3-D2DB-416F-98D8-CC76CD68F08B}" dt="2022-05-13T09:57:52.073" v="69"/>
+        <pc:sldMkLst>
+          <pc:docMk/>
+          <pc:sldMk cId="3094036770" sldId="262"/>
+        </pc:sldMkLst>
+        <pc:spChg chg="add del mod">
+          <ac:chgData name="Gonzalez Diaz Sergio" userId="dac0d5b6-ec0d-43f8-830d-6804c08729bd" providerId="ADAL" clId="{B1F265F3-D2DB-416F-98D8-CC76CD68F08B}" dt="2022-05-13T09:57:51.733" v="68" actId="478"/>
+          <ac:spMkLst>
+            <pc:docMk/>
+            <pc:sldMk cId="3094036770" sldId="262"/>
+            <ac:spMk id="12" creationId="{5875C029-C629-4E93-9678-17A1C86EEE26}"/>
+          </ac:spMkLst>
+        </pc:spChg>
+        <pc:spChg chg="add mod">
+          <ac:chgData name="Gonzalez Diaz Sergio" userId="dac0d5b6-ec0d-43f8-830d-6804c08729bd" providerId="ADAL" clId="{B1F265F3-D2DB-416F-98D8-CC76CD68F08B}" dt="2022-05-13T09:57:52.073" v="69"/>
+          <ac:spMkLst>
+            <pc:docMk/>
+            <pc:sldMk cId="3094036770" sldId="262"/>
+            <ac:spMk id="13" creationId="{12766168-2B1D-4AE2-B0B3-D74BBB1EE39B}"/>
+          </ac:spMkLst>
+        </pc:spChg>
+      </pc:sldChg>
+      <pc:sldChg chg="addSp delSp modSp mod">
+        <pc:chgData name="Gonzalez Diaz Sergio" userId="dac0d5b6-ec0d-43f8-830d-6804c08729bd" providerId="ADAL" clId="{B1F265F3-D2DB-416F-98D8-CC76CD68F08B}" dt="2022-05-13T09:58:19.244" v="71"/>
+        <pc:sldMkLst>
+          <pc:docMk/>
+          <pc:sldMk cId="3980729536" sldId="263"/>
+        </pc:sldMkLst>
+        <pc:spChg chg="add del mod">
+          <ac:chgData name="Gonzalez Diaz Sergio" userId="dac0d5b6-ec0d-43f8-830d-6804c08729bd" providerId="ADAL" clId="{B1F265F3-D2DB-416F-98D8-CC76CD68F08B}" dt="2022-05-13T09:58:18.974" v="70" actId="478"/>
+          <ac:spMkLst>
+            <pc:docMk/>
+            <pc:sldMk cId="3980729536" sldId="263"/>
+            <ac:spMk id="12" creationId="{EA35B04B-2E70-465F-8BBA-A7221C516FF7}"/>
+          </ac:spMkLst>
+        </pc:spChg>
+        <pc:spChg chg="add mod">
+          <ac:chgData name="Gonzalez Diaz Sergio" userId="dac0d5b6-ec0d-43f8-830d-6804c08729bd" providerId="ADAL" clId="{B1F265F3-D2DB-416F-98D8-CC76CD68F08B}" dt="2022-05-13T09:58:19.244" v="71"/>
+          <ac:spMkLst>
+            <pc:docMk/>
+            <pc:sldMk cId="3980729536" sldId="263"/>
+            <ac:spMk id="13" creationId="{8645C841-06B6-4ED8-B4E2-8DE6B903BBE7}"/>
+          </ac:spMkLst>
+        </pc:spChg>
+      </pc:sldChg>
+      <pc:sldChg chg="addSp modSp">
+        <pc:chgData name="Gonzalez Diaz Sergio" userId="dac0d5b6-ec0d-43f8-830d-6804c08729bd" providerId="ADAL" clId="{B1F265F3-D2DB-416F-98D8-CC76CD68F08B}" dt="2022-05-13T09:53:20.982" v="29"/>
+        <pc:sldMkLst>
+          <pc:docMk/>
+          <pc:sldMk cId="3561953235" sldId="264"/>
+        </pc:sldMkLst>
+        <pc:spChg chg="add mod">
+          <ac:chgData name="Gonzalez Diaz Sergio" userId="dac0d5b6-ec0d-43f8-830d-6804c08729bd" providerId="ADAL" clId="{B1F265F3-D2DB-416F-98D8-CC76CD68F08B}" dt="2022-05-13T09:53:20.982" v="29"/>
+          <ac:spMkLst>
+            <pc:docMk/>
+            <pc:sldMk cId="3561953235" sldId="264"/>
+            <ac:spMk id="48" creationId="{EBF49483-B41F-44C3-A601-399FDD3F648B}"/>
+          </ac:spMkLst>
+        </pc:spChg>
+      </pc:sldChg>
+      <pc:sldChg chg="addSp delSp modSp mod">
+        <pc:chgData name="Gonzalez Diaz Sergio" userId="dac0d5b6-ec0d-43f8-830d-6804c08729bd" providerId="ADAL" clId="{B1F265F3-D2DB-416F-98D8-CC76CD68F08B}" dt="2022-05-13T09:58:52.604" v="73"/>
+        <pc:sldMkLst>
+          <pc:docMk/>
+          <pc:sldMk cId="1213516533" sldId="266"/>
+        </pc:sldMkLst>
+        <pc:spChg chg="mod">
+          <ac:chgData name="Gonzalez Diaz Sergio" userId="dac0d5b6-ec0d-43f8-830d-6804c08729bd" providerId="ADAL" clId="{B1F265F3-D2DB-416F-98D8-CC76CD68F08B}" dt="2022-05-13T09:18:37.414" v="0" actId="14100"/>
+          <ac:spMkLst>
+            <pc:docMk/>
+            <pc:sldMk cId="1213516533" sldId="266"/>
+            <ac:spMk id="9" creationId="{F55185F4-147C-4007-96CA-CCCCB6E0AAC6}"/>
+          </ac:spMkLst>
+        </pc:spChg>
+        <pc:spChg chg="add del mod">
+          <ac:chgData name="Gonzalez Diaz Sergio" userId="dac0d5b6-ec0d-43f8-830d-6804c08729bd" providerId="ADAL" clId="{B1F265F3-D2DB-416F-98D8-CC76CD68F08B}" dt="2022-05-13T09:58:52.121" v="72" actId="478"/>
+          <ac:spMkLst>
+            <pc:docMk/>
+            <pc:sldMk cId="1213516533" sldId="266"/>
+            <ac:spMk id="27" creationId="{2F898C8F-4B58-48A1-BF2F-60819720A9CC}"/>
+          </ac:spMkLst>
+        </pc:spChg>
+        <pc:spChg chg="add mod">
+          <ac:chgData name="Gonzalez Diaz Sergio" userId="dac0d5b6-ec0d-43f8-830d-6804c08729bd" providerId="ADAL" clId="{B1F265F3-D2DB-416F-98D8-CC76CD68F08B}" dt="2022-05-13T09:58:52.604" v="73"/>
+          <ac:spMkLst>
+            <pc:docMk/>
+            <pc:sldMk cId="1213516533" sldId="266"/>
+            <ac:spMk id="28" creationId="{BA66871E-9A51-45A7-A56B-CB80D7DEB21E}"/>
+          </ac:spMkLst>
+        </pc:spChg>
+      </pc:sldChg>
+      <pc:sldChg chg="addSp delSp modSp mod">
+        <pc:chgData name="Gonzalez Diaz Sergio" userId="dac0d5b6-ec0d-43f8-830d-6804c08729bd" providerId="ADAL" clId="{B1F265F3-D2DB-416F-98D8-CC76CD68F08B}" dt="2022-05-13T09:59:39.846" v="76"/>
+        <pc:sldMkLst>
+          <pc:docMk/>
+          <pc:sldMk cId="3369123368" sldId="267"/>
+        </pc:sldMkLst>
+        <pc:spChg chg="add del mod">
+          <ac:chgData name="Gonzalez Diaz Sergio" userId="dac0d5b6-ec0d-43f8-830d-6804c08729bd" providerId="ADAL" clId="{B1F265F3-D2DB-416F-98D8-CC76CD68F08B}" dt="2022-05-13T09:59:39.105" v="75" actId="478"/>
+          <ac:spMkLst>
+            <pc:docMk/>
+            <pc:sldMk cId="3369123368" sldId="267"/>
+            <ac:spMk id="44" creationId="{4E84D936-E29B-430E-B45F-CB15B35FA7E1}"/>
+          </ac:spMkLst>
+        </pc:spChg>
+        <pc:spChg chg="add mod">
+          <ac:chgData name="Gonzalez Diaz Sergio" userId="dac0d5b6-ec0d-43f8-830d-6804c08729bd" providerId="ADAL" clId="{B1F265F3-D2DB-416F-98D8-CC76CD68F08B}" dt="2022-05-13T09:59:39.846" v="76"/>
+          <ac:spMkLst>
+            <pc:docMk/>
+            <pc:sldMk cId="3369123368" sldId="267"/>
+            <ac:spMk id="45" creationId="{BD7F9605-EAE5-4DAD-9429-66C528126CF0}"/>
+          </ac:spMkLst>
+        </pc:spChg>
+      </pc:sldChg>
+      <pc:sldChg chg="addSp delSp modSp mod">
+        <pc:chgData name="Gonzalez Diaz Sergio" userId="dac0d5b6-ec0d-43f8-830d-6804c08729bd" providerId="ADAL" clId="{B1F265F3-D2DB-416F-98D8-CC76CD68F08B}" dt="2022-05-13T10:01:03.226" v="80"/>
+        <pc:sldMkLst>
+          <pc:docMk/>
+          <pc:sldMk cId="3547497588" sldId="268"/>
+        </pc:sldMkLst>
+        <pc:spChg chg="add del mod">
+          <ac:chgData name="Gonzalez Diaz Sergio" userId="dac0d5b6-ec0d-43f8-830d-6804c08729bd" providerId="ADAL" clId="{B1F265F3-D2DB-416F-98D8-CC76CD68F08B}" dt="2022-05-13T10:01:02.916" v="79" actId="478"/>
+          <ac:spMkLst>
+            <pc:docMk/>
+            <pc:sldMk cId="3547497588" sldId="268"/>
+            <ac:spMk id="13" creationId="{2309BD60-4F2F-43C9-98BD-B2C9F74D6C1E}"/>
+          </ac:spMkLst>
+        </pc:spChg>
+        <pc:spChg chg="add mod">
+          <ac:chgData name="Gonzalez Diaz Sergio" userId="dac0d5b6-ec0d-43f8-830d-6804c08729bd" providerId="ADAL" clId="{B1F265F3-D2DB-416F-98D8-CC76CD68F08B}" dt="2022-05-13T10:01:03.226" v="80"/>
+          <ac:spMkLst>
+            <pc:docMk/>
+            <pc:sldMk cId="3547497588" sldId="268"/>
+            <ac:spMk id="14" creationId="{3C7188E6-2D4D-4BA4-9884-530AA6872684}"/>
+          </ac:spMkLst>
+        </pc:spChg>
+      </pc:sldChg>
+      <pc:sldChg chg="addSp delSp modSp mod">
+        <pc:chgData name="Gonzalez Diaz Sergio" userId="dac0d5b6-ec0d-43f8-830d-6804c08729bd" providerId="ADAL" clId="{B1F265F3-D2DB-416F-98D8-CC76CD68F08B}" dt="2022-05-13T10:01:06.841" v="82"/>
+        <pc:sldMkLst>
+          <pc:docMk/>
+          <pc:sldMk cId="1453104656" sldId="269"/>
+        </pc:sldMkLst>
+        <pc:spChg chg="add del mod">
+          <ac:chgData name="Gonzalez Diaz Sergio" userId="dac0d5b6-ec0d-43f8-830d-6804c08729bd" providerId="ADAL" clId="{B1F265F3-D2DB-416F-98D8-CC76CD68F08B}" dt="2022-05-13T10:01:06.538" v="81" actId="478"/>
+          <ac:spMkLst>
+            <pc:docMk/>
+            <pc:sldMk cId="1453104656" sldId="269"/>
+            <ac:spMk id="62" creationId="{B6E7806F-52B1-4FB0-8BE4-8FDCE47BF5EF}"/>
+          </ac:spMkLst>
+        </pc:spChg>
+        <pc:spChg chg="add mod">
+          <ac:chgData name="Gonzalez Diaz Sergio" userId="dac0d5b6-ec0d-43f8-830d-6804c08729bd" providerId="ADAL" clId="{B1F265F3-D2DB-416F-98D8-CC76CD68F08B}" dt="2022-05-13T10:01:06.841" v="82"/>
+          <ac:spMkLst>
+            <pc:docMk/>
+            <pc:sldMk cId="1453104656" sldId="269"/>
+            <ac:spMk id="66" creationId="{70334BF0-C87B-48CD-982B-0D22DA768A3D}"/>
+          </ac:spMkLst>
+        </pc:spChg>
+      </pc:sldChg>
+      <pc:sldChg chg="addSp modSp mod">
+        <pc:chgData name="Gonzalez Diaz Sergio" userId="dac0d5b6-ec0d-43f8-830d-6804c08729bd" providerId="ADAL" clId="{B1F265F3-D2DB-416F-98D8-CC76CD68F08B}" dt="2022-05-13T09:55:47.974" v="53" actId="20577"/>
+        <pc:sldMkLst>
+          <pc:docMk/>
+          <pc:sldMk cId="3883917516" sldId="270"/>
+        </pc:sldMkLst>
+        <pc:spChg chg="add mod">
+          <ac:chgData name="Gonzalez Diaz Sergio" userId="dac0d5b6-ec0d-43f8-830d-6804c08729bd" providerId="ADAL" clId="{B1F265F3-D2DB-416F-98D8-CC76CD68F08B}" dt="2022-05-13T09:55:47.974" v="53" actId="20577"/>
+          <ac:spMkLst>
+            <pc:docMk/>
+            <pc:sldMk cId="3883917516" sldId="270"/>
+            <ac:spMk id="9" creationId="{F0F1979E-DD1F-455A-A26C-104EA965840B}"/>
+          </ac:spMkLst>
+        </pc:spChg>
+      </pc:sldChg>
+      <pc:sldChg chg="addSp modSp mod">
+        <pc:chgData name="Gonzalez Diaz Sergio" userId="dac0d5b6-ec0d-43f8-830d-6804c08729bd" providerId="ADAL" clId="{B1F265F3-D2DB-416F-98D8-CC76CD68F08B}" dt="2022-05-13T09:55:42.113" v="48" actId="20577"/>
+        <pc:sldMkLst>
+          <pc:docMk/>
+          <pc:sldMk cId="2959769486" sldId="271"/>
+        </pc:sldMkLst>
+        <pc:spChg chg="add mod">
+          <ac:chgData name="Gonzalez Diaz Sergio" userId="dac0d5b6-ec0d-43f8-830d-6804c08729bd" providerId="ADAL" clId="{B1F265F3-D2DB-416F-98D8-CC76CD68F08B}" dt="2022-05-13T09:55:42.113" v="48" actId="20577"/>
+          <ac:spMkLst>
+            <pc:docMk/>
+            <pc:sldMk cId="2959769486" sldId="271"/>
+            <ac:spMk id="9" creationId="{14FB114E-71F6-4442-A1BC-8D8CAD0CDE7C}"/>
+          </ac:spMkLst>
+        </pc:spChg>
+      </pc:sldChg>
+      <pc:sldChg chg="addSp delSp modSp mod">
+        <pc:chgData name="Gonzalez Diaz Sergio" userId="dac0d5b6-ec0d-43f8-830d-6804c08729bd" providerId="ADAL" clId="{B1F265F3-D2DB-416F-98D8-CC76CD68F08B}" dt="2022-05-13T09:59:42.692" v="78"/>
+        <pc:sldMkLst>
+          <pc:docMk/>
+          <pc:sldMk cId="2071405982" sldId="272"/>
+        </pc:sldMkLst>
+        <pc:spChg chg="add del mod">
+          <ac:chgData name="Gonzalez Diaz Sergio" userId="dac0d5b6-ec0d-43f8-830d-6804c08729bd" providerId="ADAL" clId="{B1F265F3-D2DB-416F-98D8-CC76CD68F08B}" dt="2022-05-13T09:59:42.420" v="77" actId="478"/>
+          <ac:spMkLst>
+            <pc:docMk/>
+            <pc:sldMk cId="2071405982" sldId="272"/>
+            <ac:spMk id="19" creationId="{16A004CC-297A-4214-A370-D8404E81A320}"/>
+          </ac:spMkLst>
+        </pc:spChg>
+        <pc:spChg chg="add mod">
+          <ac:chgData name="Gonzalez Diaz Sergio" userId="dac0d5b6-ec0d-43f8-830d-6804c08729bd" providerId="ADAL" clId="{B1F265F3-D2DB-416F-98D8-CC76CD68F08B}" dt="2022-05-13T09:59:42.692" v="78"/>
+          <ac:spMkLst>
+            <pc:docMk/>
+            <pc:sldMk cId="2071405982" sldId="272"/>
+            <ac:spMk id="20" creationId="{A92D7E7E-1D50-4CA7-89A6-D87BEE5F5E10}"/>
+          </ac:spMkLst>
+        </pc:spChg>
+      </pc:sldChg>
+      <pc:sldChg chg="addSp delSp modSp mod">
+        <pc:chgData name="Gonzalez Diaz Sergio" userId="dac0d5b6-ec0d-43f8-830d-6804c08729bd" providerId="ADAL" clId="{B1F265F3-D2DB-416F-98D8-CC76CD68F08B}" dt="2022-05-13T10:01:09.515" v="84"/>
+        <pc:sldMkLst>
+          <pc:docMk/>
+          <pc:sldMk cId="1714739941" sldId="273"/>
+        </pc:sldMkLst>
+        <pc:spChg chg="add del mod">
+          <ac:chgData name="Gonzalez Diaz Sergio" userId="dac0d5b6-ec0d-43f8-830d-6804c08729bd" providerId="ADAL" clId="{B1F265F3-D2DB-416F-98D8-CC76CD68F08B}" dt="2022-05-13T10:01:09.286" v="83" actId="478"/>
+          <ac:spMkLst>
+            <pc:docMk/>
+            <pc:sldMk cId="1714739941" sldId="273"/>
+            <ac:spMk id="8" creationId="{D54A6AFB-320E-491D-A401-9A31FFE83DDD}"/>
+          </ac:spMkLst>
+        </pc:spChg>
+        <pc:spChg chg="add mod">
+          <ac:chgData name="Gonzalez Diaz Sergio" userId="dac0d5b6-ec0d-43f8-830d-6804c08729bd" providerId="ADAL" clId="{B1F265F3-D2DB-416F-98D8-CC76CD68F08B}" dt="2022-05-13T10:01:09.515" v="84"/>
+          <ac:spMkLst>
+            <pc:docMk/>
+            <pc:sldMk cId="1714739941" sldId="273"/>
+            <ac:spMk id="9" creationId="{0A4156BE-58D3-4F98-8DCC-AE9658B2E597}"/>
+          </ac:spMkLst>
+        </pc:spChg>
+      </pc:sldChg>
+    </pc:docChg>
+  </pc:docChgLst>
 </pc:chgInfo>
 </file>
 
@@ -1260,7 +1573,7 @@
           <a:p>
             <a:fld id="{0C61CF30-DE61-461E-AAC4-6E49BA39EF82}" type="datetimeFigureOut">
               <a:rPr lang="en-US" smtClean="0"/>
-              <a:t>5/5/2022</a:t>
+              <a:t>5/13/2022</a:t>
             </a:fld>
             <a:endParaRPr lang="en-US"/>
           </a:p>
@@ -1674,7 +1987,7 @@
           <a:p>
             <a:fld id="{5D2372E6-3DEE-4B43-ADE9-D3CE0FEDAA57}" type="datetimeFigureOut">
               <a:rPr lang="en-US" smtClean="0"/>
-              <a:t>5/5/2022</a:t>
+              <a:t>5/13/2022</a:t>
             </a:fld>
             <a:endParaRPr lang="en-US"/>
           </a:p>
@@ -1872,7 +2185,7 @@
           <a:p>
             <a:fld id="{5D2372E6-3DEE-4B43-ADE9-D3CE0FEDAA57}" type="datetimeFigureOut">
               <a:rPr lang="en-US" smtClean="0"/>
-              <a:t>5/5/2022</a:t>
+              <a:t>5/13/2022</a:t>
             </a:fld>
             <a:endParaRPr lang="en-US"/>
           </a:p>
@@ -2080,7 +2393,7 @@
           <a:p>
             <a:fld id="{5D2372E6-3DEE-4B43-ADE9-D3CE0FEDAA57}" type="datetimeFigureOut">
               <a:rPr lang="en-US" smtClean="0"/>
-              <a:t>5/5/2022</a:t>
+              <a:t>5/13/2022</a:t>
             </a:fld>
             <a:endParaRPr lang="en-US"/>
           </a:p>
@@ -2278,7 +2591,7 @@
           <a:p>
             <a:fld id="{5D2372E6-3DEE-4B43-ADE9-D3CE0FEDAA57}" type="datetimeFigureOut">
               <a:rPr lang="en-US" smtClean="0"/>
-              <a:t>5/5/2022</a:t>
+              <a:t>5/13/2022</a:t>
             </a:fld>
             <a:endParaRPr lang="en-US"/>
           </a:p>
@@ -2553,7 +2866,7 @@
           <a:p>
             <a:fld id="{5D2372E6-3DEE-4B43-ADE9-D3CE0FEDAA57}" type="datetimeFigureOut">
               <a:rPr lang="en-US" smtClean="0"/>
-              <a:t>5/5/2022</a:t>
+              <a:t>5/13/2022</a:t>
             </a:fld>
             <a:endParaRPr lang="en-US"/>
           </a:p>
@@ -2818,7 +3131,7 @@
           <a:p>
             <a:fld id="{5D2372E6-3DEE-4B43-ADE9-D3CE0FEDAA57}" type="datetimeFigureOut">
               <a:rPr lang="en-US" smtClean="0"/>
-              <a:t>5/5/2022</a:t>
+              <a:t>5/13/2022</a:t>
             </a:fld>
             <a:endParaRPr lang="en-US"/>
           </a:p>
@@ -3230,7 +3543,7 @@
           <a:p>
             <a:fld id="{5D2372E6-3DEE-4B43-ADE9-D3CE0FEDAA57}" type="datetimeFigureOut">
               <a:rPr lang="en-US" smtClean="0"/>
-              <a:t>5/5/2022</a:t>
+              <a:t>5/13/2022</a:t>
             </a:fld>
             <a:endParaRPr lang="en-US"/>
           </a:p>
@@ -3371,7 +3684,7 @@
           <a:p>
             <a:fld id="{5D2372E6-3DEE-4B43-ADE9-D3CE0FEDAA57}" type="datetimeFigureOut">
               <a:rPr lang="en-US" smtClean="0"/>
-              <a:t>5/5/2022</a:t>
+              <a:t>5/13/2022</a:t>
             </a:fld>
             <a:endParaRPr lang="en-US"/>
           </a:p>
@@ -3484,7 +3797,7 @@
           <a:p>
             <a:fld id="{5D2372E6-3DEE-4B43-ADE9-D3CE0FEDAA57}" type="datetimeFigureOut">
               <a:rPr lang="en-US" smtClean="0"/>
-              <a:t>5/5/2022</a:t>
+              <a:t>5/13/2022</a:t>
             </a:fld>
             <a:endParaRPr lang="en-US"/>
           </a:p>
@@ -3795,7 +4108,7 @@
           <a:p>
             <a:fld id="{5D2372E6-3DEE-4B43-ADE9-D3CE0FEDAA57}" type="datetimeFigureOut">
               <a:rPr lang="en-US" smtClean="0"/>
-              <a:t>5/5/2022</a:t>
+              <a:t>5/13/2022</a:t>
             </a:fld>
             <a:endParaRPr lang="en-US"/>
           </a:p>
@@ -4083,7 +4396,7 @@
           <a:p>
             <a:fld id="{5D2372E6-3DEE-4B43-ADE9-D3CE0FEDAA57}" type="datetimeFigureOut">
               <a:rPr lang="en-US" smtClean="0"/>
-              <a:t>5/5/2022</a:t>
+              <a:t>5/13/2022</a:t>
             </a:fld>
             <a:endParaRPr lang="en-US"/>
           </a:p>
@@ -4324,7 +4637,7 @@
           <a:p>
             <a:fld id="{5D2372E6-3DEE-4B43-ADE9-D3CE0FEDAA57}" type="datetimeFigureOut">
               <a:rPr lang="en-US" smtClean="0"/>
-              <a:t>5/5/2022</a:t>
+              <a:t>5/13/2022</a:t>
             </a:fld>
             <a:endParaRPr lang="en-US"/>
           </a:p>
@@ -5731,6 +6044,63 @@
           </a:p>
         </p:txBody>
       </p:sp>
+      <p:sp>
+        <p:nvSpPr>
+          <p:cNvPr id="13" name="Rectángulo 12">
+            <a:extLst>
+              <a:ext uri="{FF2B5EF4-FFF2-40B4-BE49-F238E27FC236}">
+                <a16:creationId xmlns:a16="http://schemas.microsoft.com/office/drawing/2014/main" id="{12766168-2B1D-4AE2-B0B3-D74BBB1EE39B}"/>
+              </a:ext>
+            </a:extLst>
+          </p:cNvPr>
+          <p:cNvSpPr/>
+          <p:nvPr/>
+        </p:nvSpPr>
+        <p:spPr>
+          <a:xfrm>
+            <a:off x="9965933" y="5384832"/>
+            <a:ext cx="1828800" cy="697469"/>
+          </a:xfrm>
+          <a:prstGeom prst="rect">
+            <a:avLst/>
+          </a:prstGeom>
+          <a:solidFill>
+            <a:schemeClr val="accent4">
+              <a:lumMod val="75000"/>
+            </a:schemeClr>
+          </a:solidFill>
+          <a:ln>
+            <a:noFill/>
+          </a:ln>
+        </p:spPr>
+        <p:style>
+          <a:lnRef idx="2">
+            <a:schemeClr val="accent1">
+              <a:shade val="50000"/>
+            </a:schemeClr>
+          </a:lnRef>
+          <a:fillRef idx="1">
+            <a:schemeClr val="accent1"/>
+          </a:fillRef>
+          <a:effectRef idx="0">
+            <a:schemeClr val="accent1"/>
+          </a:effectRef>
+          <a:fontRef idx="minor">
+            <a:schemeClr val="lt1"/>
+          </a:fontRef>
+        </p:style>
+        <p:txBody>
+          <a:bodyPr rtlCol="0" anchor="ctr"/>
+          <a:lstStyle/>
+          <a:p>
+            <a:pPr algn="ctr"/>
+            <a:r>
+              <a:rPr lang="es-ES" sz="2000" dirty="0"/>
+              <a:t>No escaneado</a:t>
+            </a:r>
+          </a:p>
+        </p:txBody>
+      </p:sp>
     </p:spTree>
     <p:extLst>
       <p:ext uri="{BB962C8B-B14F-4D97-AF65-F5344CB8AC3E}">
@@ -6084,6 +6454,63 @@
           </a:p>
         </p:txBody>
       </p:sp>
+      <p:sp>
+        <p:nvSpPr>
+          <p:cNvPr id="13" name="Rectángulo 12">
+            <a:extLst>
+              <a:ext uri="{FF2B5EF4-FFF2-40B4-BE49-F238E27FC236}">
+                <a16:creationId xmlns:a16="http://schemas.microsoft.com/office/drawing/2014/main" id="{8645C841-06B6-4ED8-B4E2-8DE6B903BBE7}"/>
+              </a:ext>
+            </a:extLst>
+          </p:cNvPr>
+          <p:cNvSpPr/>
+          <p:nvPr/>
+        </p:nvSpPr>
+        <p:spPr>
+          <a:xfrm>
+            <a:off x="9965933" y="5384832"/>
+            <a:ext cx="1828800" cy="697469"/>
+          </a:xfrm>
+          <a:prstGeom prst="rect">
+            <a:avLst/>
+          </a:prstGeom>
+          <a:solidFill>
+            <a:schemeClr val="accent4">
+              <a:lumMod val="75000"/>
+            </a:schemeClr>
+          </a:solidFill>
+          <a:ln>
+            <a:noFill/>
+          </a:ln>
+        </p:spPr>
+        <p:style>
+          <a:lnRef idx="2">
+            <a:schemeClr val="accent1">
+              <a:shade val="50000"/>
+            </a:schemeClr>
+          </a:lnRef>
+          <a:fillRef idx="1">
+            <a:schemeClr val="accent1"/>
+          </a:fillRef>
+          <a:effectRef idx="0">
+            <a:schemeClr val="accent1"/>
+          </a:effectRef>
+          <a:fontRef idx="minor">
+            <a:schemeClr val="lt1"/>
+          </a:fontRef>
+        </p:style>
+        <p:txBody>
+          <a:bodyPr rtlCol="0" anchor="ctr"/>
+          <a:lstStyle/>
+          <a:p>
+            <a:pPr algn="ctr"/>
+            <a:r>
+              <a:rPr lang="es-ES" sz="2000" dirty="0"/>
+              <a:t>No escaneado</a:t>
+            </a:r>
+          </a:p>
+        </p:txBody>
+      </p:sp>
     </p:spTree>
     <p:extLst>
       <p:ext uri="{BB962C8B-B14F-4D97-AF65-F5344CB8AC3E}">
@@ -7781,6 +8208,61 @@
           </a:p>
         </p:txBody>
       </p:sp>
+      <p:sp>
+        <p:nvSpPr>
+          <p:cNvPr id="48" name="Rectángulo 47">
+            <a:extLst>
+              <a:ext uri="{FF2B5EF4-FFF2-40B4-BE49-F238E27FC236}">
+                <a16:creationId xmlns:a16="http://schemas.microsoft.com/office/drawing/2014/main" id="{EBF49483-B41F-44C3-A601-399FDD3F648B}"/>
+              </a:ext>
+            </a:extLst>
+          </p:cNvPr>
+          <p:cNvSpPr/>
+          <p:nvPr/>
+        </p:nvSpPr>
+        <p:spPr>
+          <a:xfrm>
+            <a:off x="9965933" y="5384832"/>
+            <a:ext cx="1828800" cy="697469"/>
+          </a:xfrm>
+          <a:prstGeom prst="rect">
+            <a:avLst/>
+          </a:prstGeom>
+          <a:solidFill>
+            <a:schemeClr val="accent6"/>
+          </a:solidFill>
+          <a:ln>
+            <a:noFill/>
+          </a:ln>
+        </p:spPr>
+        <p:style>
+          <a:lnRef idx="2">
+            <a:schemeClr val="accent1">
+              <a:shade val="50000"/>
+            </a:schemeClr>
+          </a:lnRef>
+          <a:fillRef idx="1">
+            <a:schemeClr val="accent1"/>
+          </a:fillRef>
+          <a:effectRef idx="0">
+            <a:schemeClr val="accent1"/>
+          </a:effectRef>
+          <a:fontRef idx="minor">
+            <a:schemeClr val="lt1"/>
+          </a:fontRef>
+        </p:style>
+        <p:txBody>
+          <a:bodyPr rtlCol="0" anchor="ctr"/>
+          <a:lstStyle/>
+          <a:p>
+            <a:pPr algn="ctr"/>
+            <a:r>
+              <a:rPr lang="es-ES" sz="2000" dirty="0"/>
+              <a:t>Escaneado</a:t>
+            </a:r>
+          </a:p>
+        </p:txBody>
+      </p:sp>
     </p:spTree>
     <p:extLst>
       <p:ext uri="{BB962C8B-B14F-4D97-AF65-F5344CB8AC3E}">
@@ -7967,8 +8449,8 @@
         </p:nvSpPr>
         <p:spPr>
           <a:xfrm>
-            <a:off x="5181599" y="2957513"/>
-            <a:ext cx="395289" cy="90487"/>
+            <a:off x="3743325" y="2957513"/>
+            <a:ext cx="1833564" cy="90488"/>
           </a:xfrm>
           <a:prstGeom prst="rect">
             <a:avLst/>
@@ -8843,6 +9325,63 @@
           </a:prstGeom>
         </p:spPr>
       </p:pic>
+      <p:sp>
+        <p:nvSpPr>
+          <p:cNvPr id="28" name="Rectángulo 27">
+            <a:extLst>
+              <a:ext uri="{FF2B5EF4-FFF2-40B4-BE49-F238E27FC236}">
+                <a16:creationId xmlns:a16="http://schemas.microsoft.com/office/drawing/2014/main" id="{BA66871E-9A51-45A7-A56B-CB80D7DEB21E}"/>
+              </a:ext>
+            </a:extLst>
+          </p:cNvPr>
+          <p:cNvSpPr/>
+          <p:nvPr/>
+        </p:nvSpPr>
+        <p:spPr>
+          <a:xfrm>
+            <a:off x="9965933" y="5384832"/>
+            <a:ext cx="1828800" cy="697469"/>
+          </a:xfrm>
+          <a:prstGeom prst="rect">
+            <a:avLst/>
+          </a:prstGeom>
+          <a:solidFill>
+            <a:schemeClr val="accent4">
+              <a:lumMod val="75000"/>
+            </a:schemeClr>
+          </a:solidFill>
+          <a:ln>
+            <a:noFill/>
+          </a:ln>
+        </p:spPr>
+        <p:style>
+          <a:lnRef idx="2">
+            <a:schemeClr val="accent1">
+              <a:shade val="50000"/>
+            </a:schemeClr>
+          </a:lnRef>
+          <a:fillRef idx="1">
+            <a:schemeClr val="accent1"/>
+          </a:fillRef>
+          <a:effectRef idx="0">
+            <a:schemeClr val="accent1"/>
+          </a:effectRef>
+          <a:fontRef idx="minor">
+            <a:schemeClr val="lt1"/>
+          </a:fontRef>
+        </p:style>
+        <p:txBody>
+          <a:bodyPr rtlCol="0" anchor="ctr"/>
+          <a:lstStyle/>
+          <a:p>
+            <a:pPr algn="ctr"/>
+            <a:r>
+              <a:rPr lang="es-ES" sz="2000" dirty="0"/>
+              <a:t>No escaneado</a:t>
+            </a:r>
+          </a:p>
+        </p:txBody>
+      </p:sp>
     </p:spTree>
     <p:extLst>
       <p:ext uri="{BB962C8B-B14F-4D97-AF65-F5344CB8AC3E}">
@@ -10374,6 +10913,63 @@
           </a:p>
         </p:txBody>
       </p:sp>
+      <p:sp>
+        <p:nvSpPr>
+          <p:cNvPr id="45" name="Rectángulo 44">
+            <a:extLst>
+              <a:ext uri="{FF2B5EF4-FFF2-40B4-BE49-F238E27FC236}">
+                <a16:creationId xmlns:a16="http://schemas.microsoft.com/office/drawing/2014/main" id="{BD7F9605-EAE5-4DAD-9429-66C528126CF0}"/>
+              </a:ext>
+            </a:extLst>
+          </p:cNvPr>
+          <p:cNvSpPr/>
+          <p:nvPr/>
+        </p:nvSpPr>
+        <p:spPr>
+          <a:xfrm>
+            <a:off x="9965933" y="5384832"/>
+            <a:ext cx="1828800" cy="697469"/>
+          </a:xfrm>
+          <a:prstGeom prst="rect">
+            <a:avLst/>
+          </a:prstGeom>
+          <a:solidFill>
+            <a:schemeClr val="accent4">
+              <a:lumMod val="75000"/>
+            </a:schemeClr>
+          </a:solidFill>
+          <a:ln>
+            <a:noFill/>
+          </a:ln>
+        </p:spPr>
+        <p:style>
+          <a:lnRef idx="2">
+            <a:schemeClr val="accent1">
+              <a:shade val="50000"/>
+            </a:schemeClr>
+          </a:lnRef>
+          <a:fillRef idx="1">
+            <a:schemeClr val="accent1"/>
+          </a:fillRef>
+          <a:effectRef idx="0">
+            <a:schemeClr val="accent1"/>
+          </a:effectRef>
+          <a:fontRef idx="minor">
+            <a:schemeClr val="lt1"/>
+          </a:fontRef>
+        </p:style>
+        <p:txBody>
+          <a:bodyPr rtlCol="0" anchor="ctr"/>
+          <a:lstStyle/>
+          <a:p>
+            <a:pPr algn="ctr"/>
+            <a:r>
+              <a:rPr lang="es-ES" sz="2000" dirty="0"/>
+              <a:t>No escaneado</a:t>
+            </a:r>
+          </a:p>
+        </p:txBody>
+      </p:sp>
     </p:spTree>
     <p:extLst>
       <p:ext uri="{BB962C8B-B14F-4D97-AF65-F5344CB8AC3E}">
@@ -11089,6 +11685,63 @@
           </a:prstGeom>
         </p:spPr>
       </p:pic>
+      <p:sp>
+        <p:nvSpPr>
+          <p:cNvPr id="20" name="Rectángulo 19">
+            <a:extLst>
+              <a:ext uri="{FF2B5EF4-FFF2-40B4-BE49-F238E27FC236}">
+                <a16:creationId xmlns:a16="http://schemas.microsoft.com/office/drawing/2014/main" id="{A92D7E7E-1D50-4CA7-89A6-D87BEE5F5E10}"/>
+              </a:ext>
+            </a:extLst>
+          </p:cNvPr>
+          <p:cNvSpPr/>
+          <p:nvPr/>
+        </p:nvSpPr>
+        <p:spPr>
+          <a:xfrm>
+            <a:off x="9965933" y="5384832"/>
+            <a:ext cx="1828800" cy="697469"/>
+          </a:xfrm>
+          <a:prstGeom prst="rect">
+            <a:avLst/>
+          </a:prstGeom>
+          <a:solidFill>
+            <a:schemeClr val="accent4">
+              <a:lumMod val="75000"/>
+            </a:schemeClr>
+          </a:solidFill>
+          <a:ln>
+            <a:noFill/>
+          </a:ln>
+        </p:spPr>
+        <p:style>
+          <a:lnRef idx="2">
+            <a:schemeClr val="accent1">
+              <a:shade val="50000"/>
+            </a:schemeClr>
+          </a:lnRef>
+          <a:fillRef idx="1">
+            <a:schemeClr val="accent1"/>
+          </a:fillRef>
+          <a:effectRef idx="0">
+            <a:schemeClr val="accent1"/>
+          </a:effectRef>
+          <a:fontRef idx="minor">
+            <a:schemeClr val="lt1"/>
+          </a:fontRef>
+        </p:style>
+        <p:txBody>
+          <a:bodyPr rtlCol="0" anchor="ctr"/>
+          <a:lstStyle/>
+          <a:p>
+            <a:pPr algn="ctr"/>
+            <a:r>
+              <a:rPr lang="es-ES" sz="2000" dirty="0"/>
+              <a:t>No escaneado</a:t>
+            </a:r>
+          </a:p>
+        </p:txBody>
+      </p:sp>
     </p:spTree>
     <p:extLst>
       <p:ext uri="{BB962C8B-B14F-4D97-AF65-F5344CB8AC3E}">
@@ -11442,6 +12095,63 @@
           </a:p>
         </p:txBody>
       </p:sp>
+      <p:sp>
+        <p:nvSpPr>
+          <p:cNvPr id="14" name="Rectángulo 13">
+            <a:extLst>
+              <a:ext uri="{FF2B5EF4-FFF2-40B4-BE49-F238E27FC236}">
+                <a16:creationId xmlns:a16="http://schemas.microsoft.com/office/drawing/2014/main" id="{3C7188E6-2D4D-4BA4-9884-530AA6872684}"/>
+              </a:ext>
+            </a:extLst>
+          </p:cNvPr>
+          <p:cNvSpPr/>
+          <p:nvPr/>
+        </p:nvSpPr>
+        <p:spPr>
+          <a:xfrm>
+            <a:off x="9965933" y="5384832"/>
+            <a:ext cx="1828800" cy="697469"/>
+          </a:xfrm>
+          <a:prstGeom prst="rect">
+            <a:avLst/>
+          </a:prstGeom>
+          <a:solidFill>
+            <a:schemeClr val="accent4">
+              <a:lumMod val="75000"/>
+            </a:schemeClr>
+          </a:solidFill>
+          <a:ln>
+            <a:noFill/>
+          </a:ln>
+        </p:spPr>
+        <p:style>
+          <a:lnRef idx="2">
+            <a:schemeClr val="accent1">
+              <a:shade val="50000"/>
+            </a:schemeClr>
+          </a:lnRef>
+          <a:fillRef idx="1">
+            <a:schemeClr val="accent1"/>
+          </a:fillRef>
+          <a:effectRef idx="0">
+            <a:schemeClr val="accent1"/>
+          </a:effectRef>
+          <a:fontRef idx="minor">
+            <a:schemeClr val="lt1"/>
+          </a:fontRef>
+        </p:style>
+        <p:txBody>
+          <a:bodyPr rtlCol="0" anchor="ctr"/>
+          <a:lstStyle/>
+          <a:p>
+            <a:pPr algn="ctr"/>
+            <a:r>
+              <a:rPr lang="es-ES" sz="2000" dirty="0"/>
+              <a:t>No escaneado</a:t>
+            </a:r>
+          </a:p>
+        </p:txBody>
+      </p:sp>
     </p:spTree>
     <p:extLst>
       <p:ext uri="{BB962C8B-B14F-4D97-AF65-F5344CB8AC3E}">
@@ -14135,6 +14845,63 @@
           </a:p>
         </p:txBody>
       </p:sp>
+      <p:sp>
+        <p:nvSpPr>
+          <p:cNvPr id="66" name="Rectángulo 65">
+            <a:extLst>
+              <a:ext uri="{FF2B5EF4-FFF2-40B4-BE49-F238E27FC236}">
+                <a16:creationId xmlns:a16="http://schemas.microsoft.com/office/drawing/2014/main" id="{70334BF0-C87B-48CD-982B-0D22DA768A3D}"/>
+              </a:ext>
+            </a:extLst>
+          </p:cNvPr>
+          <p:cNvSpPr/>
+          <p:nvPr/>
+        </p:nvSpPr>
+        <p:spPr>
+          <a:xfrm>
+            <a:off x="9965933" y="5384832"/>
+            <a:ext cx="1828800" cy="697469"/>
+          </a:xfrm>
+          <a:prstGeom prst="rect">
+            <a:avLst/>
+          </a:prstGeom>
+          <a:solidFill>
+            <a:schemeClr val="accent4">
+              <a:lumMod val="75000"/>
+            </a:schemeClr>
+          </a:solidFill>
+          <a:ln>
+            <a:noFill/>
+          </a:ln>
+        </p:spPr>
+        <p:style>
+          <a:lnRef idx="2">
+            <a:schemeClr val="accent1">
+              <a:shade val="50000"/>
+            </a:schemeClr>
+          </a:lnRef>
+          <a:fillRef idx="1">
+            <a:schemeClr val="accent1"/>
+          </a:fillRef>
+          <a:effectRef idx="0">
+            <a:schemeClr val="accent1"/>
+          </a:effectRef>
+          <a:fontRef idx="minor">
+            <a:schemeClr val="lt1"/>
+          </a:fontRef>
+        </p:style>
+        <p:txBody>
+          <a:bodyPr rtlCol="0" anchor="ctr"/>
+          <a:lstStyle/>
+          <a:p>
+            <a:pPr algn="ctr"/>
+            <a:r>
+              <a:rPr lang="es-ES" sz="2000" dirty="0"/>
+              <a:t>No escaneado</a:t>
+            </a:r>
+          </a:p>
+        </p:txBody>
+      </p:sp>
     </p:spTree>
     <p:extLst>
       <p:ext uri="{BB962C8B-B14F-4D97-AF65-F5344CB8AC3E}">
@@ -14332,6 +15099,63 @@
           </a:prstGeom>
         </p:spPr>
       </p:pic>
+      <p:sp>
+        <p:nvSpPr>
+          <p:cNvPr id="9" name="Rectángulo 8">
+            <a:extLst>
+              <a:ext uri="{FF2B5EF4-FFF2-40B4-BE49-F238E27FC236}">
+                <a16:creationId xmlns:a16="http://schemas.microsoft.com/office/drawing/2014/main" id="{0A4156BE-58D3-4F98-8DCC-AE9658B2E597}"/>
+              </a:ext>
+            </a:extLst>
+          </p:cNvPr>
+          <p:cNvSpPr/>
+          <p:nvPr/>
+        </p:nvSpPr>
+        <p:spPr>
+          <a:xfrm>
+            <a:off x="9965933" y="5384832"/>
+            <a:ext cx="1828800" cy="697469"/>
+          </a:xfrm>
+          <a:prstGeom prst="rect">
+            <a:avLst/>
+          </a:prstGeom>
+          <a:solidFill>
+            <a:schemeClr val="accent4">
+              <a:lumMod val="75000"/>
+            </a:schemeClr>
+          </a:solidFill>
+          <a:ln>
+            <a:noFill/>
+          </a:ln>
+        </p:spPr>
+        <p:style>
+          <a:lnRef idx="2">
+            <a:schemeClr val="accent1">
+              <a:shade val="50000"/>
+            </a:schemeClr>
+          </a:lnRef>
+          <a:fillRef idx="1">
+            <a:schemeClr val="accent1"/>
+          </a:fillRef>
+          <a:effectRef idx="0">
+            <a:schemeClr val="accent1"/>
+          </a:effectRef>
+          <a:fontRef idx="minor">
+            <a:schemeClr val="lt1"/>
+          </a:fontRef>
+        </p:style>
+        <p:txBody>
+          <a:bodyPr rtlCol="0" anchor="ctr"/>
+          <a:lstStyle/>
+          <a:p>
+            <a:pPr algn="ctr"/>
+            <a:r>
+              <a:rPr lang="es-ES" sz="2000" dirty="0"/>
+              <a:t>No escaneado</a:t>
+            </a:r>
+          </a:p>
+        </p:txBody>
+      </p:sp>
     </p:spTree>
     <p:extLst>
       <p:ext uri="{BB962C8B-B14F-4D97-AF65-F5344CB8AC3E}">
@@ -15179,6 +16003,61 @@
           <a:p>
             <a:pPr algn="ctr"/>
             <a:endParaRPr lang="es-ES" dirty="0"/>
+          </a:p>
+        </p:txBody>
+      </p:sp>
+      <p:sp>
+        <p:nvSpPr>
+          <p:cNvPr id="2" name="Rectángulo 1">
+            <a:extLst>
+              <a:ext uri="{FF2B5EF4-FFF2-40B4-BE49-F238E27FC236}">
+                <a16:creationId xmlns:a16="http://schemas.microsoft.com/office/drawing/2014/main" id="{F9E1EBAB-24B4-4FFF-BEAB-BFDC4AEC6CCB}"/>
+              </a:ext>
+            </a:extLst>
+          </p:cNvPr>
+          <p:cNvSpPr/>
+          <p:nvPr/>
+        </p:nvSpPr>
+        <p:spPr>
+          <a:xfrm>
+            <a:off x="9965933" y="5384832"/>
+            <a:ext cx="1828800" cy="697469"/>
+          </a:xfrm>
+          <a:prstGeom prst="rect">
+            <a:avLst/>
+          </a:prstGeom>
+          <a:solidFill>
+            <a:schemeClr val="accent6"/>
+          </a:solidFill>
+          <a:ln>
+            <a:noFill/>
+          </a:ln>
+        </p:spPr>
+        <p:style>
+          <a:lnRef idx="2">
+            <a:schemeClr val="accent1">
+              <a:shade val="50000"/>
+            </a:schemeClr>
+          </a:lnRef>
+          <a:fillRef idx="1">
+            <a:schemeClr val="accent1"/>
+          </a:fillRef>
+          <a:effectRef idx="0">
+            <a:schemeClr val="accent1"/>
+          </a:effectRef>
+          <a:fontRef idx="minor">
+            <a:schemeClr val="lt1"/>
+          </a:fontRef>
+        </p:style>
+        <p:txBody>
+          <a:bodyPr rtlCol="0" anchor="ctr"/>
+          <a:lstStyle/>
+          <a:p>
+            <a:pPr algn="ctr"/>
+            <a:r>
+              <a:rPr lang="es-ES" sz="2000" dirty="0"/>
+              <a:t>Escaneado</a:t>
+            </a:r>
           </a:p>
         </p:txBody>
       </p:sp>
@@ -18919,6 +19798,61 @@
           </a:p>
         </p:txBody>
       </p:sp>
+      <p:sp>
+        <p:nvSpPr>
+          <p:cNvPr id="12" name="Rectángulo 11">
+            <a:extLst>
+              <a:ext uri="{FF2B5EF4-FFF2-40B4-BE49-F238E27FC236}">
+                <a16:creationId xmlns:a16="http://schemas.microsoft.com/office/drawing/2014/main" id="{80730CAE-802C-4708-95F8-903DDC0880F2}"/>
+              </a:ext>
+            </a:extLst>
+          </p:cNvPr>
+          <p:cNvSpPr/>
+          <p:nvPr/>
+        </p:nvSpPr>
+        <p:spPr>
+          <a:xfrm>
+            <a:off x="9965933" y="5384832"/>
+            <a:ext cx="1828800" cy="697469"/>
+          </a:xfrm>
+          <a:prstGeom prst="rect">
+            <a:avLst/>
+          </a:prstGeom>
+          <a:solidFill>
+            <a:schemeClr val="accent6"/>
+          </a:solidFill>
+          <a:ln>
+            <a:noFill/>
+          </a:ln>
+        </p:spPr>
+        <p:style>
+          <a:lnRef idx="2">
+            <a:schemeClr val="accent1">
+              <a:shade val="50000"/>
+            </a:schemeClr>
+          </a:lnRef>
+          <a:fillRef idx="1">
+            <a:schemeClr val="accent1"/>
+          </a:fillRef>
+          <a:effectRef idx="0">
+            <a:schemeClr val="accent1"/>
+          </a:effectRef>
+          <a:fontRef idx="minor">
+            <a:schemeClr val="lt1"/>
+          </a:fontRef>
+        </p:style>
+        <p:txBody>
+          <a:bodyPr rtlCol="0" anchor="ctr"/>
+          <a:lstStyle/>
+          <a:p>
+            <a:pPr algn="ctr"/>
+            <a:r>
+              <a:rPr lang="es-ES" sz="2000" dirty="0"/>
+              <a:t>Escaneado</a:t>
+            </a:r>
+          </a:p>
+        </p:txBody>
+      </p:sp>
     </p:spTree>
     <p:extLst>
       <p:ext uri="{BB962C8B-B14F-4D97-AF65-F5344CB8AC3E}">
@@ -19355,6 +20289,63 @@
           </a:p>
         </p:txBody>
       </p:sp>
+      <p:sp>
+        <p:nvSpPr>
+          <p:cNvPr id="15" name="Rectángulo 14">
+            <a:extLst>
+              <a:ext uri="{FF2B5EF4-FFF2-40B4-BE49-F238E27FC236}">
+                <a16:creationId xmlns:a16="http://schemas.microsoft.com/office/drawing/2014/main" id="{92013717-84DF-4DD1-A75F-41DA45B60F7C}"/>
+              </a:ext>
+            </a:extLst>
+          </p:cNvPr>
+          <p:cNvSpPr/>
+          <p:nvPr/>
+        </p:nvSpPr>
+        <p:spPr>
+          <a:xfrm>
+            <a:off x="9965933" y="5384832"/>
+            <a:ext cx="1828800" cy="697469"/>
+          </a:xfrm>
+          <a:prstGeom prst="rect">
+            <a:avLst/>
+          </a:prstGeom>
+          <a:solidFill>
+            <a:schemeClr val="accent4">
+              <a:lumMod val="75000"/>
+            </a:schemeClr>
+          </a:solidFill>
+          <a:ln>
+            <a:noFill/>
+          </a:ln>
+        </p:spPr>
+        <p:style>
+          <a:lnRef idx="2">
+            <a:schemeClr val="accent1">
+              <a:shade val="50000"/>
+            </a:schemeClr>
+          </a:lnRef>
+          <a:fillRef idx="1">
+            <a:schemeClr val="accent1"/>
+          </a:fillRef>
+          <a:effectRef idx="0">
+            <a:schemeClr val="accent1"/>
+          </a:effectRef>
+          <a:fontRef idx="minor">
+            <a:schemeClr val="lt1"/>
+          </a:fontRef>
+        </p:style>
+        <p:txBody>
+          <a:bodyPr rtlCol="0" anchor="ctr"/>
+          <a:lstStyle/>
+          <a:p>
+            <a:pPr algn="ctr"/>
+            <a:r>
+              <a:rPr lang="es-ES" sz="2000" dirty="0"/>
+              <a:t>No Escaneado</a:t>
+            </a:r>
+          </a:p>
+        </p:txBody>
+      </p:sp>
     </p:spTree>
     <p:extLst>
       <p:ext uri="{BB962C8B-B14F-4D97-AF65-F5344CB8AC3E}">
@@ -19695,6 +20686,63 @@
           </a:p>
         </p:txBody>
       </p:sp>
+      <p:sp>
+        <p:nvSpPr>
+          <p:cNvPr id="9" name="Rectángulo 8">
+            <a:extLst>
+              <a:ext uri="{FF2B5EF4-FFF2-40B4-BE49-F238E27FC236}">
+                <a16:creationId xmlns:a16="http://schemas.microsoft.com/office/drawing/2014/main" id="{F0F1979E-DD1F-455A-A26C-104EA965840B}"/>
+              </a:ext>
+            </a:extLst>
+          </p:cNvPr>
+          <p:cNvSpPr/>
+          <p:nvPr/>
+        </p:nvSpPr>
+        <p:spPr>
+          <a:xfrm>
+            <a:off x="9965933" y="5384832"/>
+            <a:ext cx="1828800" cy="697469"/>
+          </a:xfrm>
+          <a:prstGeom prst="rect">
+            <a:avLst/>
+          </a:prstGeom>
+          <a:solidFill>
+            <a:schemeClr val="accent4">
+              <a:lumMod val="75000"/>
+            </a:schemeClr>
+          </a:solidFill>
+          <a:ln>
+            <a:noFill/>
+          </a:ln>
+        </p:spPr>
+        <p:style>
+          <a:lnRef idx="2">
+            <a:schemeClr val="accent1">
+              <a:shade val="50000"/>
+            </a:schemeClr>
+          </a:lnRef>
+          <a:fillRef idx="1">
+            <a:schemeClr val="accent1"/>
+          </a:fillRef>
+          <a:effectRef idx="0">
+            <a:schemeClr val="accent1"/>
+          </a:effectRef>
+          <a:fontRef idx="minor">
+            <a:schemeClr val="lt1"/>
+          </a:fontRef>
+        </p:style>
+        <p:txBody>
+          <a:bodyPr rtlCol="0" anchor="ctr"/>
+          <a:lstStyle/>
+          <a:p>
+            <a:pPr algn="ctr"/>
+            <a:r>
+              <a:rPr lang="es-ES" sz="2000" dirty="0"/>
+              <a:t>No escaneado</a:t>
+            </a:r>
+          </a:p>
+        </p:txBody>
+      </p:sp>
     </p:spTree>
     <p:extLst>
       <p:ext uri="{BB962C8B-B14F-4D97-AF65-F5344CB8AC3E}">
@@ -20035,6 +21083,63 @@
           </a:p>
         </p:txBody>
       </p:sp>
+      <p:sp>
+        <p:nvSpPr>
+          <p:cNvPr id="9" name="Rectángulo 8">
+            <a:extLst>
+              <a:ext uri="{FF2B5EF4-FFF2-40B4-BE49-F238E27FC236}">
+                <a16:creationId xmlns:a16="http://schemas.microsoft.com/office/drawing/2014/main" id="{14FB114E-71F6-4442-A1BC-8D8CAD0CDE7C}"/>
+              </a:ext>
+            </a:extLst>
+          </p:cNvPr>
+          <p:cNvSpPr/>
+          <p:nvPr/>
+        </p:nvSpPr>
+        <p:spPr>
+          <a:xfrm>
+            <a:off x="9965933" y="5384832"/>
+            <a:ext cx="1828800" cy="697469"/>
+          </a:xfrm>
+          <a:prstGeom prst="rect">
+            <a:avLst/>
+          </a:prstGeom>
+          <a:solidFill>
+            <a:schemeClr val="accent4">
+              <a:lumMod val="75000"/>
+            </a:schemeClr>
+          </a:solidFill>
+          <a:ln>
+            <a:noFill/>
+          </a:ln>
+        </p:spPr>
+        <p:style>
+          <a:lnRef idx="2">
+            <a:schemeClr val="accent1">
+              <a:shade val="50000"/>
+            </a:schemeClr>
+          </a:lnRef>
+          <a:fillRef idx="1">
+            <a:schemeClr val="accent1"/>
+          </a:fillRef>
+          <a:effectRef idx="0">
+            <a:schemeClr val="accent1"/>
+          </a:effectRef>
+          <a:fontRef idx="minor">
+            <a:schemeClr val="lt1"/>
+          </a:fontRef>
+        </p:style>
+        <p:txBody>
+          <a:bodyPr rtlCol="0" anchor="ctr"/>
+          <a:lstStyle/>
+          <a:p>
+            <a:pPr algn="ctr"/>
+            <a:r>
+              <a:rPr lang="es-ES" sz="2000" dirty="0"/>
+              <a:t>No escaneado</a:t>
+            </a:r>
+          </a:p>
+        </p:txBody>
+      </p:sp>
     </p:spTree>
     <p:extLst>
       <p:ext uri="{BB962C8B-B14F-4D97-AF65-F5344CB8AC3E}">
@@ -21487,6 +22592,63 @@
           </a:prstGeom>
         </p:spPr>
       </p:pic>
+      <p:sp>
+        <p:nvSpPr>
+          <p:cNvPr id="38" name="Rectángulo 37">
+            <a:extLst>
+              <a:ext uri="{FF2B5EF4-FFF2-40B4-BE49-F238E27FC236}">
+                <a16:creationId xmlns:a16="http://schemas.microsoft.com/office/drawing/2014/main" id="{F2B3F7D9-1A06-44AF-9ED0-1BFF58ECEDFE}"/>
+              </a:ext>
+            </a:extLst>
+          </p:cNvPr>
+          <p:cNvSpPr/>
+          <p:nvPr/>
+        </p:nvSpPr>
+        <p:spPr>
+          <a:xfrm>
+            <a:off x="9965933" y="5384832"/>
+            <a:ext cx="1828800" cy="697469"/>
+          </a:xfrm>
+          <a:prstGeom prst="rect">
+            <a:avLst/>
+          </a:prstGeom>
+          <a:solidFill>
+            <a:schemeClr val="accent4">
+              <a:lumMod val="75000"/>
+            </a:schemeClr>
+          </a:solidFill>
+          <a:ln>
+            <a:noFill/>
+          </a:ln>
+        </p:spPr>
+        <p:style>
+          <a:lnRef idx="2">
+            <a:schemeClr val="accent1">
+              <a:shade val="50000"/>
+            </a:schemeClr>
+          </a:lnRef>
+          <a:fillRef idx="1">
+            <a:schemeClr val="accent1"/>
+          </a:fillRef>
+          <a:effectRef idx="0">
+            <a:schemeClr val="accent1"/>
+          </a:effectRef>
+          <a:fontRef idx="minor">
+            <a:schemeClr val="lt1"/>
+          </a:fontRef>
+        </p:style>
+        <p:txBody>
+          <a:bodyPr rtlCol="0" anchor="ctr"/>
+          <a:lstStyle/>
+          <a:p>
+            <a:pPr algn="ctr"/>
+            <a:r>
+              <a:rPr lang="es-ES" sz="2000" dirty="0"/>
+              <a:t>No escaneado</a:t>
+            </a:r>
+          </a:p>
+        </p:txBody>
+      </p:sp>
     </p:spTree>
     <p:extLst>
       <p:ext uri="{BB962C8B-B14F-4D97-AF65-F5344CB8AC3E}">
@@ -21837,6 +22999,63 @@
           <a:p>
             <a:pPr algn="ctr"/>
             <a:endParaRPr lang="es-ES" dirty="0"/>
+          </a:p>
+        </p:txBody>
+      </p:sp>
+      <p:sp>
+        <p:nvSpPr>
+          <p:cNvPr id="9" name="Rectángulo 8">
+            <a:extLst>
+              <a:ext uri="{FF2B5EF4-FFF2-40B4-BE49-F238E27FC236}">
+                <a16:creationId xmlns:a16="http://schemas.microsoft.com/office/drawing/2014/main" id="{BB415FAF-9663-4C3B-9ECD-8A8F669052EB}"/>
+              </a:ext>
+            </a:extLst>
+          </p:cNvPr>
+          <p:cNvSpPr/>
+          <p:nvPr/>
+        </p:nvSpPr>
+        <p:spPr>
+          <a:xfrm>
+            <a:off x="9965933" y="5384832"/>
+            <a:ext cx="1828800" cy="697469"/>
+          </a:xfrm>
+          <a:prstGeom prst="rect">
+            <a:avLst/>
+          </a:prstGeom>
+          <a:solidFill>
+            <a:schemeClr val="accent4">
+              <a:lumMod val="75000"/>
+            </a:schemeClr>
+          </a:solidFill>
+          <a:ln>
+            <a:noFill/>
+          </a:ln>
+        </p:spPr>
+        <p:style>
+          <a:lnRef idx="2">
+            <a:schemeClr val="accent1">
+              <a:shade val="50000"/>
+            </a:schemeClr>
+          </a:lnRef>
+          <a:fillRef idx="1">
+            <a:schemeClr val="accent1"/>
+          </a:fillRef>
+          <a:effectRef idx="0">
+            <a:schemeClr val="accent1"/>
+          </a:effectRef>
+          <a:fontRef idx="minor">
+            <a:schemeClr val="lt1"/>
+          </a:fontRef>
+        </p:style>
+        <p:txBody>
+          <a:bodyPr rtlCol="0" anchor="ctr"/>
+          <a:lstStyle/>
+          <a:p>
+            <a:pPr algn="ctr"/>
+            <a:r>
+              <a:rPr lang="es-ES" sz="2000" dirty="0"/>
+              <a:t>No escaneado</a:t>
+            </a:r>
           </a:p>
         </p:txBody>
       </p:sp>

</xml_diff>

<commit_message>
(Back up, code not working) First approach to ESP provider
</commit_message>
<xml_diff>
--- a/AI_Engine/Info/ExtraccionDatos.pptx
+++ b/AI_Engine/Info/ExtraccionDatos.pptx
@@ -1170,7 +1170,7 @@
   <pc:docChgLst>
     <pc:chgData name="Gonzalez Diaz Sergio" userId="dac0d5b6-ec0d-43f8-830d-6804c08729bd" providerId="ADAL" clId="{B1F265F3-D2DB-416F-98D8-CC76CD68F08B}"/>
     <pc:docChg chg="custSel modSld">
-      <pc:chgData name="Gonzalez Diaz Sergio" userId="dac0d5b6-ec0d-43f8-830d-6804c08729bd" providerId="ADAL" clId="{B1F265F3-D2DB-416F-98D8-CC76CD68F08B}" dt="2022-05-13T10:01:09.515" v="84"/>
+      <pc:chgData name="Gonzalez Diaz Sergio" userId="dac0d5b6-ec0d-43f8-830d-6804c08729bd" providerId="ADAL" clId="{B1F265F3-D2DB-416F-98D8-CC76CD68F08B}" dt="2022-05-26T10:02:15.708" v="108" actId="1037"/>
       <pc:docMkLst>
         <pc:docMk/>
       </pc:docMkLst>
@@ -1234,8 +1234,8 @@
           </ac:spMkLst>
         </pc:spChg>
       </pc:sldChg>
-      <pc:sldChg chg="addSp modSp mod">
-        <pc:chgData name="Gonzalez Diaz Sergio" userId="dac0d5b6-ec0d-43f8-830d-6804c08729bd" providerId="ADAL" clId="{B1F265F3-D2DB-416F-98D8-CC76CD68F08B}" dt="2022-05-13T09:56:52.842" v="67" actId="20577"/>
+      <pc:sldChg chg="addSp delSp modSp mod">
+        <pc:chgData name="Gonzalez Diaz Sergio" userId="dac0d5b6-ec0d-43f8-830d-6804c08729bd" providerId="ADAL" clId="{B1F265F3-D2DB-416F-98D8-CC76CD68F08B}" dt="2022-05-26T10:02:15.708" v="108" actId="1037"/>
         <pc:sldMkLst>
           <pc:docMk/>
           <pc:sldMk cId="934720096" sldId="261"/>
@@ -1246,6 +1246,30 @@
             <pc:docMk/>
             <pc:sldMk cId="934720096" sldId="261"/>
             <ac:spMk id="9" creationId="{BB415FAF-9663-4C3B-9ECD-8A8F669052EB}"/>
+          </ac:spMkLst>
+        </pc:spChg>
+        <pc:spChg chg="add mod">
+          <ac:chgData name="Gonzalez Diaz Sergio" userId="dac0d5b6-ec0d-43f8-830d-6804c08729bd" providerId="ADAL" clId="{B1F265F3-D2DB-416F-98D8-CC76CD68F08B}" dt="2022-05-26T10:01:09.107" v="86"/>
+          <ac:spMkLst>
+            <pc:docMk/>
+            <pc:sldMk cId="934720096" sldId="261"/>
+            <ac:spMk id="10" creationId="{B9698FAE-0605-4659-A8CC-8F09FB5B4212}"/>
+          </ac:spMkLst>
+        </pc:spChg>
+        <pc:spChg chg="mod">
+          <ac:chgData name="Gonzalez Diaz Sergio" userId="dac0d5b6-ec0d-43f8-830d-6804c08729bd" providerId="ADAL" clId="{B1F265F3-D2DB-416F-98D8-CC76CD68F08B}" dt="2022-05-26T10:02:15.708" v="108" actId="1037"/>
+          <ac:spMkLst>
+            <pc:docMk/>
+            <pc:sldMk cId="934720096" sldId="261"/>
+            <ac:spMk id="13" creationId="{2047952B-59FF-463D-A31B-78299011C89A}"/>
+          </ac:spMkLst>
+        </pc:spChg>
+        <pc:spChg chg="del">
+          <ac:chgData name="Gonzalez Diaz Sergio" userId="dac0d5b6-ec0d-43f8-830d-6804c08729bd" providerId="ADAL" clId="{B1F265F3-D2DB-416F-98D8-CC76CD68F08B}" dt="2022-05-26T10:01:04.298" v="85" actId="478"/>
+          <ac:spMkLst>
+            <pc:docMk/>
+            <pc:sldMk cId="934720096" sldId="261"/>
+            <ac:spMk id="14" creationId="{E0C7BCEE-1B32-4C3B-80DB-D8D603AE12B0}"/>
           </ac:spMkLst>
         </pc:spChg>
       </pc:sldChg>
@@ -1573,7 +1597,7 @@
           <a:p>
             <a:fld id="{0C61CF30-DE61-461E-AAC4-6E49BA39EF82}" type="datetimeFigureOut">
               <a:rPr lang="en-US" smtClean="0"/>
-              <a:t>5/13/2022</a:t>
+              <a:t>5/25/2022</a:t>
             </a:fld>
             <a:endParaRPr lang="en-US"/>
           </a:p>
@@ -1987,7 +2011,7 @@
           <a:p>
             <a:fld id="{5D2372E6-3DEE-4B43-ADE9-D3CE0FEDAA57}" type="datetimeFigureOut">
               <a:rPr lang="en-US" smtClean="0"/>
-              <a:t>5/13/2022</a:t>
+              <a:t>5/25/2022</a:t>
             </a:fld>
             <a:endParaRPr lang="en-US"/>
           </a:p>
@@ -2185,7 +2209,7 @@
           <a:p>
             <a:fld id="{5D2372E6-3DEE-4B43-ADE9-D3CE0FEDAA57}" type="datetimeFigureOut">
               <a:rPr lang="en-US" smtClean="0"/>
-              <a:t>5/13/2022</a:t>
+              <a:t>5/25/2022</a:t>
             </a:fld>
             <a:endParaRPr lang="en-US"/>
           </a:p>
@@ -2393,7 +2417,7 @@
           <a:p>
             <a:fld id="{5D2372E6-3DEE-4B43-ADE9-D3CE0FEDAA57}" type="datetimeFigureOut">
               <a:rPr lang="en-US" smtClean="0"/>
-              <a:t>5/13/2022</a:t>
+              <a:t>5/25/2022</a:t>
             </a:fld>
             <a:endParaRPr lang="en-US"/>
           </a:p>
@@ -2591,7 +2615,7 @@
           <a:p>
             <a:fld id="{5D2372E6-3DEE-4B43-ADE9-D3CE0FEDAA57}" type="datetimeFigureOut">
               <a:rPr lang="en-US" smtClean="0"/>
-              <a:t>5/13/2022</a:t>
+              <a:t>5/25/2022</a:t>
             </a:fld>
             <a:endParaRPr lang="en-US"/>
           </a:p>
@@ -2866,7 +2890,7 @@
           <a:p>
             <a:fld id="{5D2372E6-3DEE-4B43-ADE9-D3CE0FEDAA57}" type="datetimeFigureOut">
               <a:rPr lang="en-US" smtClean="0"/>
-              <a:t>5/13/2022</a:t>
+              <a:t>5/25/2022</a:t>
             </a:fld>
             <a:endParaRPr lang="en-US"/>
           </a:p>
@@ -3131,7 +3155,7 @@
           <a:p>
             <a:fld id="{5D2372E6-3DEE-4B43-ADE9-D3CE0FEDAA57}" type="datetimeFigureOut">
               <a:rPr lang="en-US" smtClean="0"/>
-              <a:t>5/13/2022</a:t>
+              <a:t>5/25/2022</a:t>
             </a:fld>
             <a:endParaRPr lang="en-US"/>
           </a:p>
@@ -3543,7 +3567,7 @@
           <a:p>
             <a:fld id="{5D2372E6-3DEE-4B43-ADE9-D3CE0FEDAA57}" type="datetimeFigureOut">
               <a:rPr lang="en-US" smtClean="0"/>
-              <a:t>5/13/2022</a:t>
+              <a:t>5/25/2022</a:t>
             </a:fld>
             <a:endParaRPr lang="en-US"/>
           </a:p>
@@ -3684,7 +3708,7 @@
           <a:p>
             <a:fld id="{5D2372E6-3DEE-4B43-ADE9-D3CE0FEDAA57}" type="datetimeFigureOut">
               <a:rPr lang="en-US" smtClean="0"/>
-              <a:t>5/13/2022</a:t>
+              <a:t>5/25/2022</a:t>
             </a:fld>
             <a:endParaRPr lang="en-US"/>
           </a:p>
@@ -3797,7 +3821,7 @@
           <a:p>
             <a:fld id="{5D2372E6-3DEE-4B43-ADE9-D3CE0FEDAA57}" type="datetimeFigureOut">
               <a:rPr lang="en-US" smtClean="0"/>
-              <a:t>5/13/2022</a:t>
+              <a:t>5/25/2022</a:t>
             </a:fld>
             <a:endParaRPr lang="en-US"/>
           </a:p>
@@ -4108,7 +4132,7 @@
           <a:p>
             <a:fld id="{5D2372E6-3DEE-4B43-ADE9-D3CE0FEDAA57}" type="datetimeFigureOut">
               <a:rPr lang="en-US" smtClean="0"/>
-              <a:t>5/13/2022</a:t>
+              <a:t>5/25/2022</a:t>
             </a:fld>
             <a:endParaRPr lang="en-US"/>
           </a:p>
@@ -4396,7 +4420,7 @@
           <a:p>
             <a:fld id="{5D2372E6-3DEE-4B43-ADE9-D3CE0FEDAA57}" type="datetimeFigureOut">
               <a:rPr lang="en-US" smtClean="0"/>
-              <a:t>5/13/2022</a:t>
+              <a:t>5/25/2022</a:t>
             </a:fld>
             <a:endParaRPr lang="en-US"/>
           </a:p>
@@ -4637,7 +4661,7 @@
           <a:p>
             <a:fld id="{5D2372E6-3DEE-4B43-ADE9-D3CE0FEDAA57}" type="datetimeFigureOut">
               <a:rPr lang="en-US" smtClean="0"/>
-              <a:t>5/13/2022</a:t>
+              <a:t>5/25/2022</a:t>
             </a:fld>
             <a:endParaRPr lang="en-US"/>
           </a:p>
@@ -22914,7 +22938,7 @@
         </p:nvSpPr>
         <p:spPr>
           <a:xfrm>
-            <a:off x="4695830" y="3660775"/>
+            <a:off x="4270380" y="3660775"/>
             <a:ext cx="345664" cy="90187"/>
           </a:xfrm>
           <a:prstGeom prst="rect">
@@ -22956,54 +22980,6 @@
       </p:sp>
       <p:sp>
         <p:nvSpPr>
-          <p:cNvPr id="14" name="Rectangle 13">
-            <a:extLst>
-              <a:ext uri="{FF2B5EF4-FFF2-40B4-BE49-F238E27FC236}">
-                <a16:creationId xmlns:a16="http://schemas.microsoft.com/office/drawing/2014/main" id="{E0C7BCEE-1B32-4C3B-80DB-D8D603AE12B0}"/>
-              </a:ext>
-            </a:extLst>
-          </p:cNvPr>
-          <p:cNvSpPr/>
-          <p:nvPr/>
-        </p:nvSpPr>
-        <p:spPr>
-          <a:xfrm>
-            <a:off x="1479479" y="2308511"/>
-            <a:ext cx="749371" cy="201327"/>
-          </a:xfrm>
-          <a:prstGeom prst="rect">
-            <a:avLst/>
-          </a:prstGeom>
-          <a:noFill/>
-          <a:ln w="19050"/>
-        </p:spPr>
-        <p:style>
-          <a:lnRef idx="2">
-            <a:schemeClr val="accent6">
-              <a:shade val="50000"/>
-            </a:schemeClr>
-          </a:lnRef>
-          <a:fillRef idx="1">
-            <a:schemeClr val="accent6"/>
-          </a:fillRef>
-          <a:effectRef idx="0">
-            <a:schemeClr val="accent6"/>
-          </a:effectRef>
-          <a:fontRef idx="minor">
-            <a:schemeClr val="lt1"/>
-          </a:fontRef>
-        </p:style>
-        <p:txBody>
-          <a:bodyPr rtlCol="0" anchor="ctr"/>
-          <a:lstStyle/>
-          <a:p>
-            <a:pPr algn="ctr"/>
-            <a:endParaRPr lang="es-ES" dirty="0"/>
-          </a:p>
-        </p:txBody>
-      </p:sp>
-      <p:sp>
-        <p:nvSpPr>
           <p:cNvPr id="9" name="Rectángulo 8">
             <a:extLst>
               <a:ext uri="{FF2B5EF4-FFF2-40B4-BE49-F238E27FC236}">
@@ -23055,6 +23031,47 @@
             <a:r>
               <a:rPr lang="es-ES" sz="2000" dirty="0"/>
               <a:t>No escaneado</a:t>
+            </a:r>
+          </a:p>
+        </p:txBody>
+      </p:sp>
+      <p:sp>
+        <p:nvSpPr>
+          <p:cNvPr id="10" name="CuadroTexto 9">
+            <a:extLst>
+              <a:ext uri="{FF2B5EF4-FFF2-40B4-BE49-F238E27FC236}">
+                <a16:creationId xmlns:a16="http://schemas.microsoft.com/office/drawing/2014/main" id="{B9698FAE-0605-4659-A8CC-8F09FB5B4212}"/>
+              </a:ext>
+            </a:extLst>
+          </p:cNvPr>
+          <p:cNvSpPr txBox="1"/>
+          <p:nvPr/>
+        </p:nvSpPr>
+        <p:spPr>
+          <a:xfrm>
+            <a:off x="213064" y="878328"/>
+            <a:ext cx="1668855" cy="369332"/>
+          </a:xfrm>
+          <a:prstGeom prst="rect">
+            <a:avLst/>
+          </a:prstGeom>
+          <a:noFill/>
+        </p:spPr>
+        <p:txBody>
+          <a:bodyPr wrap="none" rtlCol="0">
+            <a:spAutoFit/>
+          </a:bodyPr>
+          <a:lstStyle/>
+          <a:p>
+            <a:r>
+              <a:rPr lang="es-ES" b="1" dirty="0">
+                <a:solidFill>
+                  <a:schemeClr val="accent6">
+                    <a:lumMod val="75000"/>
+                  </a:schemeClr>
+                </a:solidFill>
+              </a:rPr>
+              <a:t>Campos validos</a:t>
             </a:r>
           </a:p>
         </p:txBody>

</xml_diff>

<commit_message>
Corregido proveedor Soucy y añadido de diferentes coordenadas para diferentes headers.
</commit_message>
<xml_diff>
--- a/AI_Engine/Info/ExtraccionDatos.pptx
+++ b/AI_Engine/Info/ExtraccionDatos.pptx
@@ -26,13 +26,13 @@
     <p:sldId id="262" r:id="rId17"/>
     <p:sldId id="264" r:id="rId18"/>
     <p:sldId id="257" r:id="rId19"/>
-    <p:sldId id="258" r:id="rId20"/>
-    <p:sldId id="256" r:id="rId21"/>
-    <p:sldId id="276" r:id="rId22"/>
-    <p:sldId id="277" r:id="rId23"/>
-    <p:sldId id="278" r:id="rId24"/>
-    <p:sldId id="279" r:id="rId25"/>
-    <p:sldId id="280" r:id="rId26"/>
+    <p:sldId id="256" r:id="rId20"/>
+    <p:sldId id="276" r:id="rId21"/>
+    <p:sldId id="277" r:id="rId22"/>
+    <p:sldId id="278" r:id="rId23"/>
+    <p:sldId id="279" r:id="rId24"/>
+    <p:sldId id="280" r:id="rId25"/>
+    <p:sldId id="258" r:id="rId26"/>
   </p:sldIdLst>
   <p:sldSz cx="12192000" cy="6858000"/>
   <p:notesSz cx="6858000" cy="9144000"/>
@@ -134,7 +134,7 @@
   <p:extLst>
     <p:ext uri="{521415D9-36F7-43E2-AB2F-B90AF26B5E84}">
       <p14:sectionLst xmlns:p14="http://schemas.microsoft.com/office/powerpoint/2010/main">
-        <p14:section name="Default Section" id="{CBD1F8DA-DDBD-4E8D-9533-5B6610BEA515}">
+        <p14:section name="Leyenda de colores" id="{CBD1F8DA-DDBD-4E8D-9533-5B6610BEA515}">
           <p14:sldIdLst>
             <p14:sldId id="265"/>
           </p14:sldIdLst>
@@ -200,11 +200,6 @@
             <p14:sldId id="257"/>
           </p14:sldIdLst>
         </p14:section>
-        <p14:section name="Danfoss" id="{6539382C-D504-4AB4-8FBF-B5C2C5346BED}">
-          <p14:sldIdLst>
-            <p14:sldId id="258"/>
-          </p14:sldIdLst>
-        </p14:section>
         <p14:section name="Coffeyville Sektam" id="{711B7A4A-1972-4808-86CD-23C7982ADCFF}">
           <p14:sldIdLst>
             <p14:sldId id="256"/>
@@ -225,6 +220,11 @@
           <p14:sldIdLst>
             <p14:sldId id="279"/>
             <p14:sldId id="280"/>
+          </p14:sldIdLst>
+        </p14:section>
+        <p14:section name="Danfoss" id="{6539382C-D504-4AB4-8FBF-B5C2C5346BED}">
+          <p14:sldIdLst>
+            <p14:sldId id="258"/>
           </p14:sldIdLst>
         </p14:section>
       </p14:sectionLst>
@@ -2709,7 +2709,7 @@
   <pc:docChgLst>
     <pc:chgData name="Gonzalez Diaz Sergio" userId="dac0d5b6-ec0d-43f8-830d-6804c08729bd" providerId="ADAL" clId="{1363879E-5272-4F49-912F-B948C6267803}"/>
     <pc:docChg chg="undo custSel addSld modSld sldOrd addSection delSection modSection">
-      <pc:chgData name="Gonzalez Diaz Sergio" userId="dac0d5b6-ec0d-43f8-830d-6804c08729bd" providerId="ADAL" clId="{1363879E-5272-4F49-912F-B948C6267803}" dt="2022-12-01T08:24:49.106" v="194" actId="14100"/>
+      <pc:chgData name="Gonzalez Diaz Sergio" userId="dac0d5b6-ec0d-43f8-830d-6804c08729bd" providerId="ADAL" clId="{1363879E-5272-4F49-912F-B948C6267803}" dt="2022-12-01T09:42:38.940" v="200"/>
       <pc:docMkLst>
         <pc:docMk/>
       </pc:docMkLst>
@@ -2736,8 +2736,8 @@
           </ac:picMkLst>
         </pc:picChg>
       </pc:sldChg>
-      <pc:sldChg chg="delSp mod">
-        <pc:chgData name="Gonzalez Diaz Sergio" userId="dac0d5b6-ec0d-43f8-830d-6804c08729bd" providerId="ADAL" clId="{1363879E-5272-4F49-912F-B948C6267803}" dt="2022-11-30T15:07:20.596" v="45" actId="478"/>
+      <pc:sldChg chg="delSp mod ord">
+        <pc:chgData name="Gonzalez Diaz Sergio" userId="dac0d5b6-ec0d-43f8-830d-6804c08729bd" providerId="ADAL" clId="{1363879E-5272-4F49-912F-B948C6267803}" dt="2022-12-01T08:39:05.759" v="196"/>
         <pc:sldMkLst>
           <pc:docMk/>
           <pc:sldMk cId="3110176351" sldId="258"/>
@@ -3024,7 +3024,7 @@
         </pc:spChg>
       </pc:sldChg>
       <pc:sldChg chg="addSp delSp modSp add mod">
-        <pc:chgData name="Gonzalez Diaz Sergio" userId="dac0d5b6-ec0d-43f8-830d-6804c08729bd" providerId="ADAL" clId="{1363879E-5272-4F49-912F-B948C6267803}" dt="2022-11-30T15:08:28.833" v="62" actId="20577"/>
+        <pc:chgData name="Gonzalez Diaz Sergio" userId="dac0d5b6-ec0d-43f8-830d-6804c08729bd" providerId="ADAL" clId="{1363879E-5272-4F49-912F-B948C6267803}" dt="2022-12-01T09:40:36.981" v="198"/>
         <pc:sldMkLst>
           <pc:docMk/>
           <pc:sldMk cId="2975466772" sldId="276"/>
@@ -3101,6 +3101,14 @@
             <ac:grpSpMk id="4" creationId="{5143E378-BC4D-C870-5131-C1FEBA449BE0}"/>
           </ac:grpSpMkLst>
         </pc:grpChg>
+        <pc:picChg chg="add mod">
+          <ac:chgData name="Gonzalez Diaz Sergio" userId="dac0d5b6-ec0d-43f8-830d-6804c08729bd" providerId="ADAL" clId="{1363879E-5272-4F49-912F-B948C6267803}" dt="2022-12-01T09:40:36.981" v="198"/>
+          <ac:picMkLst>
+            <pc:docMk/>
+            <pc:sldMk cId="2975466772" sldId="276"/>
+            <ac:picMk id="2" creationId="{67C74156-0574-F5E5-3142-E5471DB011A6}"/>
+          </ac:picMkLst>
+        </pc:picChg>
         <pc:picChg chg="add mod modCrop">
           <ac:chgData name="Gonzalez Diaz Sergio" userId="dac0d5b6-ec0d-43f8-830d-6804c08729bd" providerId="ADAL" clId="{1363879E-5272-4F49-912F-B948C6267803}" dt="2022-11-30T15:05:57.196" v="35" actId="1076"/>
           <ac:picMkLst>
@@ -3174,7 +3182,7 @@
         </pc:picChg>
       </pc:sldChg>
       <pc:sldChg chg="addSp delSp modSp add mod">
-        <pc:chgData name="Gonzalez Diaz Sergio" userId="dac0d5b6-ec0d-43f8-830d-6804c08729bd" providerId="ADAL" clId="{1363879E-5272-4F49-912F-B948C6267803}" dt="2022-11-30T15:12:31.837" v="98" actId="20577"/>
+        <pc:chgData name="Gonzalez Diaz Sergio" userId="dac0d5b6-ec0d-43f8-830d-6804c08729bd" providerId="ADAL" clId="{1363879E-5272-4F49-912F-B948C6267803}" dt="2022-12-01T09:41:49.213" v="199"/>
         <pc:sldMkLst>
           <pc:docMk/>
           <pc:sldMk cId="2011269513" sldId="278"/>
@@ -3211,6 +3219,14 @@
             <ac:spMk id="27" creationId="{7676B774-DF1F-DCAC-9C9B-50DA529A9C0E}"/>
           </ac:spMkLst>
         </pc:spChg>
+        <pc:picChg chg="add mod">
+          <ac:chgData name="Gonzalez Diaz Sergio" userId="dac0d5b6-ec0d-43f8-830d-6804c08729bd" providerId="ADAL" clId="{1363879E-5272-4F49-912F-B948C6267803}" dt="2022-12-01T09:41:49.213" v="199"/>
+          <ac:picMkLst>
+            <pc:docMk/>
+            <pc:sldMk cId="2011269513" sldId="278"/>
+            <ac:picMk id="2" creationId="{8A42C233-4E6E-0284-91F8-B19411BF9410}"/>
+          </ac:picMkLst>
+        </pc:picChg>
         <pc:picChg chg="del">
           <ac:chgData name="Gonzalez Diaz Sergio" userId="dac0d5b6-ec0d-43f8-830d-6804c08729bd" providerId="ADAL" clId="{1363879E-5272-4F49-912F-B948C6267803}" dt="2022-11-30T15:10:49.030" v="78" actId="478"/>
           <ac:picMkLst>
@@ -3229,7 +3245,7 @@
         </pc:picChg>
       </pc:sldChg>
       <pc:sldChg chg="addSp delSp modSp add mod">
-        <pc:chgData name="Gonzalez Diaz Sergio" userId="dac0d5b6-ec0d-43f8-830d-6804c08729bd" providerId="ADAL" clId="{1363879E-5272-4F49-912F-B948C6267803}" dt="2022-12-01T08:24:49.106" v="194" actId="14100"/>
+        <pc:chgData name="Gonzalez Diaz Sergio" userId="dac0d5b6-ec0d-43f8-830d-6804c08729bd" providerId="ADAL" clId="{1363879E-5272-4F49-912F-B948C6267803}" dt="2022-12-01T09:42:38.940" v="200"/>
         <pc:sldMkLst>
           <pc:docMk/>
           <pc:sldMk cId="3778647813" sldId="279"/>
@@ -3274,6 +3290,14 @@
             <ac:spMk id="27" creationId="{7676B774-DF1F-DCAC-9C9B-50DA529A9C0E}"/>
           </ac:spMkLst>
         </pc:spChg>
+        <pc:picChg chg="add mod">
+          <ac:chgData name="Gonzalez Diaz Sergio" userId="dac0d5b6-ec0d-43f8-830d-6804c08729bd" providerId="ADAL" clId="{1363879E-5272-4F49-912F-B948C6267803}" dt="2022-12-01T09:42:38.940" v="200"/>
+          <ac:picMkLst>
+            <pc:docMk/>
+            <pc:sldMk cId="3778647813" sldId="279"/>
+            <ac:picMk id="2" creationId="{BC77570C-3CF1-2BCC-78FD-806ACA25BB47}"/>
+          </ac:picMkLst>
+        </pc:picChg>
         <pc:picChg chg="add ord">
           <ac:chgData name="Gonzalez Diaz Sergio" userId="dac0d5b6-ec0d-43f8-830d-6804c08729bd" providerId="ADAL" clId="{1363879E-5272-4F49-912F-B948C6267803}" dt="2022-11-30T15:13:27.279" v="127" actId="171"/>
           <ac:picMkLst>
@@ -21564,782 +21588,6 @@
         <p:spPr>
           <a:xfrm>
             <a:off x="0" y="-1"/>
-            <a:ext cx="3308279" cy="523220"/>
-          </a:xfrm>
-          <a:prstGeom prst="rect">
-            <a:avLst/>
-          </a:prstGeom>
-          <a:noFill/>
-        </p:spPr>
-        <p:txBody>
-          <a:bodyPr wrap="square" rtlCol="0">
-            <a:spAutoFit/>
-          </a:bodyPr>
-          <a:lstStyle/>
-          <a:p>
-            <a:r>
-              <a:rPr lang="en-US" sz="2800" b="1" i="1" u="sng" dirty="0">
-                <a:solidFill>
-                  <a:schemeClr val="accent1">
-                    <a:lumMod val="75000"/>
-                  </a:schemeClr>
-                </a:solidFill>
-              </a:rPr>
-              <a:t>Danfoss (70013219)</a:t>
-            </a:r>
-          </a:p>
-        </p:txBody>
-      </p:sp>
-      <p:pic>
-        <p:nvPicPr>
-          <p:cNvPr id="3" name="Picture 2" descr="A picture containing text, receipt, screenshot&#10;&#10;Description automatically generated">
-            <a:extLst>
-              <a:ext uri="{FF2B5EF4-FFF2-40B4-BE49-F238E27FC236}">
-                <a16:creationId xmlns:a16="http://schemas.microsoft.com/office/drawing/2014/main" id="{D478DBF4-0852-429E-9F9E-C991D15FC989}"/>
-              </a:ext>
-            </a:extLst>
-          </p:cNvPr>
-          <p:cNvPicPr>
-            <a:picLocks noChangeAspect="1"/>
-          </p:cNvPicPr>
-          <p:nvPr/>
-        </p:nvPicPr>
-        <p:blipFill>
-          <a:blip r:embed="rId2">
-            <a:extLst>
-              <a:ext uri="{28A0092B-C50C-407E-A947-70E740481C1C}">
-                <a14:useLocalDpi xmlns:a14="http://schemas.microsoft.com/office/drawing/2010/main" val="0"/>
-              </a:ext>
-            </a:extLst>
-          </a:blip>
-          <a:stretch>
-            <a:fillRect/>
-          </a:stretch>
-        </p:blipFill>
-        <p:spPr>
-          <a:xfrm>
-            <a:off x="3446318" y="0"/>
-            <a:ext cx="5299364" cy="6858000"/>
-          </a:xfrm>
-          <a:prstGeom prst="rect">
-            <a:avLst/>
-          </a:prstGeom>
-        </p:spPr>
-      </p:pic>
-      <p:sp>
-        <p:nvSpPr>
-          <p:cNvPr id="6" name="Rectangle 5">
-            <a:extLst>
-              <a:ext uri="{FF2B5EF4-FFF2-40B4-BE49-F238E27FC236}">
-                <a16:creationId xmlns:a16="http://schemas.microsoft.com/office/drawing/2014/main" id="{65F7D1BF-8C2A-4388-9DFF-442668718908}"/>
-              </a:ext>
-            </a:extLst>
-          </p:cNvPr>
-          <p:cNvSpPr/>
-          <p:nvPr/>
-        </p:nvSpPr>
-        <p:spPr>
-          <a:xfrm>
-            <a:off x="6312023" y="1162975"/>
-            <a:ext cx="621438" cy="159798"/>
-          </a:xfrm>
-          <a:prstGeom prst="rect">
-            <a:avLst/>
-          </a:prstGeom>
-          <a:noFill/>
-          <a:ln w="19050"/>
-        </p:spPr>
-        <p:style>
-          <a:lnRef idx="2">
-            <a:schemeClr val="accent1">
-              <a:shade val="50000"/>
-            </a:schemeClr>
-          </a:lnRef>
-          <a:fillRef idx="1">
-            <a:schemeClr val="accent1"/>
-          </a:fillRef>
-          <a:effectRef idx="0">
-            <a:schemeClr val="accent1"/>
-          </a:effectRef>
-          <a:fontRef idx="minor">
-            <a:schemeClr val="lt1"/>
-          </a:fontRef>
-        </p:style>
-        <p:txBody>
-          <a:bodyPr rtlCol="0" anchor="ctr"/>
-          <a:lstStyle/>
-          <a:p>
-            <a:pPr algn="ctr"/>
-            <a:endParaRPr lang="es-ES" dirty="0"/>
-          </a:p>
-        </p:txBody>
-      </p:sp>
-      <p:sp>
-        <p:nvSpPr>
-          <p:cNvPr id="8" name="Rectangle 7">
-            <a:extLst>
-              <a:ext uri="{FF2B5EF4-FFF2-40B4-BE49-F238E27FC236}">
-                <a16:creationId xmlns:a16="http://schemas.microsoft.com/office/drawing/2014/main" id="{E314069A-7AC2-4FE0-A81D-BA22C6B83599}"/>
-              </a:ext>
-            </a:extLst>
-          </p:cNvPr>
-          <p:cNvSpPr/>
-          <p:nvPr/>
-        </p:nvSpPr>
-        <p:spPr>
-          <a:xfrm>
-            <a:off x="4427220" y="4210163"/>
-            <a:ext cx="220980" cy="125617"/>
-          </a:xfrm>
-          <a:prstGeom prst="rect">
-            <a:avLst/>
-          </a:prstGeom>
-          <a:noFill/>
-          <a:ln w="19050"/>
-        </p:spPr>
-        <p:style>
-          <a:lnRef idx="2">
-            <a:schemeClr val="accent2">
-              <a:shade val="50000"/>
-            </a:schemeClr>
-          </a:lnRef>
-          <a:fillRef idx="1">
-            <a:schemeClr val="accent2"/>
-          </a:fillRef>
-          <a:effectRef idx="0">
-            <a:schemeClr val="accent2"/>
-          </a:effectRef>
-          <a:fontRef idx="minor">
-            <a:schemeClr val="lt1"/>
-          </a:fontRef>
-        </p:style>
-        <p:txBody>
-          <a:bodyPr rtlCol="0" anchor="ctr"/>
-          <a:lstStyle/>
-          <a:p>
-            <a:pPr algn="ctr"/>
-            <a:endParaRPr lang="es-ES" dirty="0"/>
-          </a:p>
-        </p:txBody>
-      </p:sp>
-      <p:sp>
-        <p:nvSpPr>
-          <p:cNvPr id="9" name="Rectangle 8">
-            <a:extLst>
-              <a:ext uri="{FF2B5EF4-FFF2-40B4-BE49-F238E27FC236}">
-                <a16:creationId xmlns:a16="http://schemas.microsoft.com/office/drawing/2014/main" id="{AC698F80-F190-4DC5-8687-3AD4909A8F56}"/>
-              </a:ext>
-            </a:extLst>
-          </p:cNvPr>
-          <p:cNvSpPr/>
-          <p:nvPr/>
-        </p:nvSpPr>
-        <p:spPr>
-          <a:xfrm>
-            <a:off x="5798820" y="4210163"/>
-            <a:ext cx="220980" cy="125617"/>
-          </a:xfrm>
-          <a:prstGeom prst="rect">
-            <a:avLst/>
-          </a:prstGeom>
-          <a:noFill/>
-          <a:ln w="19050"/>
-        </p:spPr>
-        <p:style>
-          <a:lnRef idx="2">
-            <a:schemeClr val="accent3">
-              <a:shade val="50000"/>
-            </a:schemeClr>
-          </a:lnRef>
-          <a:fillRef idx="1">
-            <a:schemeClr val="accent3"/>
-          </a:fillRef>
-          <a:effectRef idx="0">
-            <a:schemeClr val="accent3"/>
-          </a:effectRef>
-          <a:fontRef idx="minor">
-            <a:schemeClr val="lt1"/>
-          </a:fontRef>
-        </p:style>
-        <p:txBody>
-          <a:bodyPr rtlCol="0" anchor="ctr"/>
-          <a:lstStyle/>
-          <a:p>
-            <a:pPr algn="ctr"/>
-            <a:endParaRPr lang="es-ES" dirty="0"/>
-          </a:p>
-        </p:txBody>
-      </p:sp>
-      <p:sp>
-        <p:nvSpPr>
-          <p:cNvPr id="11" name="Rectangle 10">
-            <a:extLst>
-              <a:ext uri="{FF2B5EF4-FFF2-40B4-BE49-F238E27FC236}">
-                <a16:creationId xmlns:a16="http://schemas.microsoft.com/office/drawing/2014/main" id="{C9955A0E-B84D-4A4B-BF09-4D318233ABCA}"/>
-              </a:ext>
-            </a:extLst>
-          </p:cNvPr>
-          <p:cNvSpPr/>
-          <p:nvPr/>
-        </p:nvSpPr>
-        <p:spPr>
-          <a:xfrm>
-            <a:off x="7171382" y="2968103"/>
-            <a:ext cx="601018" cy="163717"/>
-          </a:xfrm>
-          <a:prstGeom prst="rect">
-            <a:avLst/>
-          </a:prstGeom>
-          <a:noFill/>
-          <a:ln w="19050"/>
-        </p:spPr>
-        <p:style>
-          <a:lnRef idx="2">
-            <a:schemeClr val="accent6">
-              <a:shade val="50000"/>
-            </a:schemeClr>
-          </a:lnRef>
-          <a:fillRef idx="1">
-            <a:schemeClr val="accent6"/>
-          </a:fillRef>
-          <a:effectRef idx="0">
-            <a:schemeClr val="accent6"/>
-          </a:effectRef>
-          <a:fontRef idx="minor">
-            <a:schemeClr val="lt1"/>
-          </a:fontRef>
-        </p:style>
-        <p:txBody>
-          <a:bodyPr rtlCol="0" anchor="ctr"/>
-          <a:lstStyle/>
-          <a:p>
-            <a:pPr algn="ctr"/>
-            <a:endParaRPr lang="es-ES" dirty="0"/>
-          </a:p>
-        </p:txBody>
-      </p:sp>
-      <p:sp>
-        <p:nvSpPr>
-          <p:cNvPr id="12" name="Rectángulo 11">
-            <a:extLst>
-              <a:ext uri="{FF2B5EF4-FFF2-40B4-BE49-F238E27FC236}">
-                <a16:creationId xmlns:a16="http://schemas.microsoft.com/office/drawing/2014/main" id="{80730CAE-802C-4708-95F8-903DDC0880F2}"/>
-              </a:ext>
-            </a:extLst>
-          </p:cNvPr>
-          <p:cNvSpPr/>
-          <p:nvPr/>
-        </p:nvSpPr>
-        <p:spPr>
-          <a:xfrm>
-            <a:off x="9965933" y="5384832"/>
-            <a:ext cx="1828800" cy="697469"/>
-          </a:xfrm>
-          <a:prstGeom prst="rect">
-            <a:avLst/>
-          </a:prstGeom>
-          <a:solidFill>
-            <a:schemeClr val="accent6"/>
-          </a:solidFill>
-          <a:ln>
-            <a:noFill/>
-          </a:ln>
-        </p:spPr>
-        <p:style>
-          <a:lnRef idx="2">
-            <a:schemeClr val="accent1">
-              <a:shade val="50000"/>
-            </a:schemeClr>
-          </a:lnRef>
-          <a:fillRef idx="1">
-            <a:schemeClr val="accent1"/>
-          </a:fillRef>
-          <a:effectRef idx="0">
-            <a:schemeClr val="accent1"/>
-          </a:effectRef>
-          <a:fontRef idx="minor">
-            <a:schemeClr val="lt1"/>
-          </a:fontRef>
-        </p:style>
-        <p:txBody>
-          <a:bodyPr rtlCol="0" anchor="ctr"/>
-          <a:lstStyle/>
-          <a:p>
-            <a:pPr algn="ctr"/>
-            <a:r>
-              <a:rPr lang="es-ES" sz="2000" dirty="0"/>
-              <a:t>Escaneado</a:t>
-            </a:r>
-          </a:p>
-        </p:txBody>
-      </p:sp>
-    </p:spTree>
-    <p:extLst>
-      <p:ext uri="{BB962C8B-B14F-4D97-AF65-F5344CB8AC3E}">
-        <p14:creationId xmlns:p14="http://schemas.microsoft.com/office/powerpoint/2010/main" val="3110176351"/>
-      </p:ext>
-    </p:extLst>
-  </p:cSld>
-  <p:clrMapOvr>
-    <a:masterClrMapping/>
-  </p:clrMapOvr>
-</p:sld>
-</file>
-
-<file path=ppt/slides/slide2.xml><?xml version="1.0" encoding="utf-8"?>
-<p:sld xmlns:a="http://schemas.openxmlformats.org/drawingml/2006/main" xmlns:r="http://schemas.openxmlformats.org/officeDocument/2006/relationships" xmlns:p="http://schemas.openxmlformats.org/presentationml/2006/main">
-  <p:cSld>
-    <p:spTree>
-      <p:nvGrpSpPr>
-        <p:cNvPr id="1" name=""/>
-        <p:cNvGrpSpPr/>
-        <p:nvPr/>
-      </p:nvGrpSpPr>
-      <p:grpSpPr>
-        <a:xfrm>
-          <a:off x="0" y="0"/>
-          <a:ext cx="0" cy="0"/>
-          <a:chOff x="0" y="0"/>
-          <a:chExt cx="0" cy="0"/>
-        </a:xfrm>
-      </p:grpSpPr>
-      <p:sp>
-        <p:nvSpPr>
-          <p:cNvPr id="7" name="TextBox 6">
-            <a:extLst>
-              <a:ext uri="{FF2B5EF4-FFF2-40B4-BE49-F238E27FC236}">
-                <a16:creationId xmlns:a16="http://schemas.microsoft.com/office/drawing/2014/main" id="{8D652E1B-EAF7-4D08-B3E2-2F133DC81CD4}"/>
-              </a:ext>
-            </a:extLst>
-          </p:cNvPr>
-          <p:cNvSpPr txBox="1"/>
-          <p:nvPr/>
-        </p:nvSpPr>
-        <p:spPr>
-          <a:xfrm>
-            <a:off x="0" y="-1"/>
-            <a:ext cx="3308279" cy="523220"/>
-          </a:xfrm>
-          <a:prstGeom prst="rect">
-            <a:avLst/>
-          </a:prstGeom>
-          <a:noFill/>
-        </p:spPr>
-        <p:txBody>
-          <a:bodyPr wrap="square" rtlCol="0">
-            <a:spAutoFit/>
-          </a:bodyPr>
-          <a:lstStyle/>
-          <a:p>
-            <a:r>
-              <a:rPr lang="en-US" sz="2800" b="1" i="1" u="sng" dirty="0">
-                <a:solidFill>
-                  <a:schemeClr val="accent1">
-                    <a:lumMod val="75000"/>
-                  </a:schemeClr>
-                </a:solidFill>
-              </a:rPr>
-              <a:t>ESP (70001256)</a:t>
-            </a:r>
-          </a:p>
-        </p:txBody>
-      </p:sp>
-      <p:grpSp>
-        <p:nvGrpSpPr>
-          <p:cNvPr id="2" name="Grupo 1">
-            <a:extLst>
-              <a:ext uri="{FF2B5EF4-FFF2-40B4-BE49-F238E27FC236}">
-                <a16:creationId xmlns:a16="http://schemas.microsoft.com/office/drawing/2014/main" id="{6E41A3D0-146B-ACBB-4987-430E9390D928}"/>
-              </a:ext>
-            </a:extLst>
-          </p:cNvPr>
-          <p:cNvGrpSpPr/>
-          <p:nvPr/>
-        </p:nvGrpSpPr>
-        <p:grpSpPr>
-          <a:xfrm>
-            <a:off x="3446318" y="0"/>
-            <a:ext cx="5299364" cy="6858000"/>
-            <a:chOff x="3446318" y="0"/>
-            <a:chExt cx="5299364" cy="6858000"/>
-          </a:xfrm>
-        </p:grpSpPr>
-        <p:pic>
-          <p:nvPicPr>
-            <p:cNvPr id="3" name="Picture 2">
-              <a:extLst>
-                <a:ext uri="{FF2B5EF4-FFF2-40B4-BE49-F238E27FC236}">
-                  <a16:creationId xmlns:a16="http://schemas.microsoft.com/office/drawing/2014/main" id="{85C88064-A869-4CA5-85C0-D8137EF263D9}"/>
-                </a:ext>
-              </a:extLst>
-            </p:cNvPr>
-            <p:cNvPicPr>
-              <a:picLocks noChangeAspect="1"/>
-            </p:cNvPicPr>
-            <p:nvPr/>
-          </p:nvPicPr>
-          <p:blipFill>
-            <a:blip r:embed="rId2">
-              <a:extLst>
-                <a:ext uri="{28A0092B-C50C-407E-A947-70E740481C1C}">
-                  <a14:useLocalDpi xmlns:a14="http://schemas.microsoft.com/office/drawing/2010/main" val="0"/>
-                </a:ext>
-              </a:extLst>
-            </a:blip>
-            <a:stretch>
-              <a:fillRect/>
-            </a:stretch>
-          </p:blipFill>
-          <p:spPr>
-            <a:xfrm>
-              <a:off x="3446318" y="0"/>
-              <a:ext cx="5299364" cy="6858000"/>
-            </a:xfrm>
-            <a:prstGeom prst="rect">
-              <a:avLst/>
-            </a:prstGeom>
-          </p:spPr>
-        </p:pic>
-        <p:sp>
-          <p:nvSpPr>
-            <p:cNvPr id="6" name="Rectangle 5">
-              <a:extLst>
-                <a:ext uri="{FF2B5EF4-FFF2-40B4-BE49-F238E27FC236}">
-                  <a16:creationId xmlns:a16="http://schemas.microsoft.com/office/drawing/2014/main" id="{5CAAD90B-7282-4CB1-8113-9C1F00CD5391}"/>
-                </a:ext>
-              </a:extLst>
-            </p:cNvPr>
-            <p:cNvSpPr/>
-            <p:nvPr/>
-          </p:nvSpPr>
-          <p:spPr>
-            <a:xfrm>
-              <a:off x="7512050" y="584201"/>
-              <a:ext cx="387350" cy="133350"/>
-            </a:xfrm>
-            <a:prstGeom prst="rect">
-              <a:avLst/>
-            </a:prstGeom>
-            <a:noFill/>
-            <a:ln w="19050"/>
-          </p:spPr>
-          <p:style>
-            <a:lnRef idx="2">
-              <a:schemeClr val="accent1">
-                <a:shade val="50000"/>
-              </a:schemeClr>
-            </a:lnRef>
-            <a:fillRef idx="1">
-              <a:schemeClr val="accent1"/>
-            </a:fillRef>
-            <a:effectRef idx="0">
-              <a:schemeClr val="accent1"/>
-            </a:effectRef>
-            <a:fontRef idx="minor">
-              <a:schemeClr val="lt1"/>
-            </a:fontRef>
-          </p:style>
-          <p:txBody>
-            <a:bodyPr rtlCol="0" anchor="ctr"/>
-            <a:lstStyle/>
-            <a:p>
-              <a:pPr algn="ctr"/>
-              <a:endParaRPr lang="es-ES" dirty="0"/>
-            </a:p>
-          </p:txBody>
-        </p:sp>
-        <p:sp>
-          <p:nvSpPr>
-            <p:cNvPr id="11" name="Rectangle 10">
-              <a:extLst>
-                <a:ext uri="{FF2B5EF4-FFF2-40B4-BE49-F238E27FC236}">
-                  <a16:creationId xmlns:a16="http://schemas.microsoft.com/office/drawing/2014/main" id="{CEAB13F5-8287-4A92-8D86-E340395E699E}"/>
-                </a:ext>
-              </a:extLst>
-            </p:cNvPr>
-            <p:cNvSpPr/>
-            <p:nvPr/>
-          </p:nvSpPr>
-          <p:spPr>
-            <a:xfrm>
-              <a:off x="5095875" y="3660775"/>
-              <a:ext cx="530225" cy="117475"/>
-            </a:xfrm>
-            <a:prstGeom prst="rect">
-              <a:avLst/>
-            </a:prstGeom>
-            <a:noFill/>
-            <a:ln w="19050"/>
-          </p:spPr>
-          <p:style>
-            <a:lnRef idx="2">
-              <a:schemeClr val="accent2">
-                <a:shade val="50000"/>
-              </a:schemeClr>
-            </a:lnRef>
-            <a:fillRef idx="1">
-              <a:schemeClr val="accent2"/>
-            </a:fillRef>
-            <a:effectRef idx="0">
-              <a:schemeClr val="accent2"/>
-            </a:effectRef>
-            <a:fontRef idx="minor">
-              <a:schemeClr val="lt1"/>
-            </a:fontRef>
-          </p:style>
-          <p:txBody>
-            <a:bodyPr rtlCol="0" anchor="ctr"/>
-            <a:lstStyle/>
-            <a:p>
-              <a:pPr algn="ctr"/>
-              <a:endParaRPr lang="es-ES" dirty="0"/>
-            </a:p>
-          </p:txBody>
-        </p:sp>
-        <p:sp>
-          <p:nvSpPr>
-            <p:cNvPr id="12" name="Rectangle 11">
-              <a:extLst>
-                <a:ext uri="{FF2B5EF4-FFF2-40B4-BE49-F238E27FC236}">
-                  <a16:creationId xmlns:a16="http://schemas.microsoft.com/office/drawing/2014/main" id="{EBF2A621-5DCB-44CD-80F4-527646BE8979}"/>
-                </a:ext>
-              </a:extLst>
-            </p:cNvPr>
-            <p:cNvSpPr/>
-            <p:nvPr/>
-          </p:nvSpPr>
-          <p:spPr>
-            <a:xfrm>
-              <a:off x="3880882" y="3660775"/>
-              <a:ext cx="297418" cy="90187"/>
-            </a:xfrm>
-            <a:prstGeom prst="rect">
-              <a:avLst/>
-            </a:prstGeom>
-            <a:noFill/>
-            <a:ln w="19050"/>
-          </p:spPr>
-          <p:style>
-            <a:lnRef idx="2">
-              <a:schemeClr val="accent3">
-                <a:shade val="50000"/>
-              </a:schemeClr>
-            </a:lnRef>
-            <a:fillRef idx="1">
-              <a:schemeClr val="accent3"/>
-            </a:fillRef>
-            <a:effectRef idx="0">
-              <a:schemeClr val="accent3"/>
-            </a:effectRef>
-            <a:fontRef idx="minor">
-              <a:schemeClr val="lt1"/>
-            </a:fontRef>
-          </p:style>
-          <p:txBody>
-            <a:bodyPr rtlCol="0" anchor="ctr"/>
-            <a:lstStyle/>
-            <a:p>
-              <a:pPr algn="ctr"/>
-              <a:endParaRPr lang="es-ES" dirty="0"/>
-            </a:p>
-          </p:txBody>
-        </p:sp>
-        <p:sp>
-          <p:nvSpPr>
-            <p:cNvPr id="13" name="Rectangle 12">
-              <a:extLst>
-                <a:ext uri="{FF2B5EF4-FFF2-40B4-BE49-F238E27FC236}">
-                  <a16:creationId xmlns:a16="http://schemas.microsoft.com/office/drawing/2014/main" id="{2047952B-59FF-463D-A31B-78299011C89A}"/>
-                </a:ext>
-              </a:extLst>
-            </p:cNvPr>
-            <p:cNvSpPr/>
-            <p:nvPr/>
-          </p:nvSpPr>
-          <p:spPr>
-            <a:xfrm>
-              <a:off x="4270380" y="3660775"/>
-              <a:ext cx="345664" cy="90187"/>
-            </a:xfrm>
-            <a:prstGeom prst="rect">
-              <a:avLst/>
-            </a:prstGeom>
-            <a:noFill/>
-            <a:ln w="19050">
-              <a:solidFill>
-                <a:schemeClr val="accent4">
-                  <a:lumMod val="75000"/>
-                </a:schemeClr>
-              </a:solidFill>
-            </a:ln>
-          </p:spPr>
-          <p:style>
-            <a:lnRef idx="2">
-              <a:schemeClr val="accent5">
-                <a:shade val="50000"/>
-              </a:schemeClr>
-            </a:lnRef>
-            <a:fillRef idx="1">
-              <a:schemeClr val="accent5"/>
-            </a:fillRef>
-            <a:effectRef idx="0">
-              <a:schemeClr val="accent5"/>
-            </a:effectRef>
-            <a:fontRef idx="minor">
-              <a:schemeClr val="lt1"/>
-            </a:fontRef>
-          </p:style>
-          <p:txBody>
-            <a:bodyPr rtlCol="0" anchor="ctr"/>
-            <a:lstStyle/>
-            <a:p>
-              <a:pPr algn="ctr"/>
-              <a:endParaRPr lang="es-ES" dirty="0"/>
-            </a:p>
-          </p:txBody>
-        </p:sp>
-      </p:grpSp>
-      <p:sp>
-        <p:nvSpPr>
-          <p:cNvPr id="9" name="Rectángulo 8">
-            <a:extLst>
-              <a:ext uri="{FF2B5EF4-FFF2-40B4-BE49-F238E27FC236}">
-                <a16:creationId xmlns:a16="http://schemas.microsoft.com/office/drawing/2014/main" id="{BB415FAF-9663-4C3B-9ECD-8A8F669052EB}"/>
-              </a:ext>
-            </a:extLst>
-          </p:cNvPr>
-          <p:cNvSpPr/>
-          <p:nvPr/>
-        </p:nvSpPr>
-        <p:spPr>
-          <a:xfrm>
-            <a:off x="9965933" y="5384832"/>
-            <a:ext cx="1828800" cy="697469"/>
-          </a:xfrm>
-          <a:prstGeom prst="rect">
-            <a:avLst/>
-          </a:prstGeom>
-          <a:solidFill>
-            <a:schemeClr val="accent4">
-              <a:lumMod val="75000"/>
-            </a:schemeClr>
-          </a:solidFill>
-          <a:ln>
-            <a:noFill/>
-          </a:ln>
-        </p:spPr>
-        <p:style>
-          <a:lnRef idx="2">
-            <a:schemeClr val="accent1">
-              <a:shade val="50000"/>
-            </a:schemeClr>
-          </a:lnRef>
-          <a:fillRef idx="1">
-            <a:schemeClr val="accent1"/>
-          </a:fillRef>
-          <a:effectRef idx="0">
-            <a:schemeClr val="accent1"/>
-          </a:effectRef>
-          <a:fontRef idx="minor">
-            <a:schemeClr val="lt1"/>
-          </a:fontRef>
-        </p:style>
-        <p:txBody>
-          <a:bodyPr rtlCol="0" anchor="ctr"/>
-          <a:lstStyle/>
-          <a:p>
-            <a:pPr algn="ctr"/>
-            <a:r>
-              <a:rPr lang="es-ES" sz="2000" dirty="0"/>
-              <a:t>No escaneado</a:t>
-            </a:r>
-          </a:p>
-        </p:txBody>
-      </p:sp>
-      <p:pic>
-        <p:nvPicPr>
-          <p:cNvPr id="14" name="Gráfico 13" descr="Marca de verificación con relleno sólido">
-            <a:extLst>
-              <a:ext uri="{FF2B5EF4-FFF2-40B4-BE49-F238E27FC236}">
-                <a16:creationId xmlns:a16="http://schemas.microsoft.com/office/drawing/2014/main" id="{5B804FA4-D8BD-3922-35AA-8A3470493487}"/>
-              </a:ext>
-            </a:extLst>
-          </p:cNvPr>
-          <p:cNvPicPr>
-            <a:picLocks noChangeAspect="1"/>
-          </p:cNvPicPr>
-          <p:nvPr/>
-        </p:nvPicPr>
-        <p:blipFill>
-          <a:blip r:embed="rId3">
-            <a:extLst>
-              <a:ext uri="{28A0092B-C50C-407E-A947-70E740481C1C}">
-                <a14:useLocalDpi xmlns:a14="http://schemas.microsoft.com/office/drawing/2010/main" val="0"/>
-              </a:ext>
-              <a:ext uri="{96DAC541-7B7A-43D3-8B79-37D633B846F1}">
-                <asvg:svgBlip xmlns:asvg="http://schemas.microsoft.com/office/drawing/2016/SVG/main" r:embed="rId4"/>
-              </a:ext>
-            </a:extLst>
-          </a:blip>
-          <a:stretch>
-            <a:fillRect/>
-          </a:stretch>
-        </p:blipFill>
-        <p:spPr>
-          <a:xfrm>
-            <a:off x="8895650" y="431033"/>
-            <a:ext cx="914400" cy="914400"/>
-          </a:xfrm>
-          <a:prstGeom prst="rect">
-            <a:avLst/>
-          </a:prstGeom>
-        </p:spPr>
-      </p:pic>
-    </p:spTree>
-    <p:extLst>
-      <p:ext uri="{BB962C8B-B14F-4D97-AF65-F5344CB8AC3E}">
-        <p14:creationId xmlns:p14="http://schemas.microsoft.com/office/powerpoint/2010/main" val="934720096"/>
-      </p:ext>
-    </p:extLst>
-  </p:cSld>
-  <p:clrMapOvr>
-    <a:masterClrMapping/>
-  </p:clrMapOvr>
-</p:sld>
-</file>
-
-<file path=ppt/slides/slide20.xml><?xml version="1.0" encoding="utf-8"?>
-<p:sld xmlns:a="http://schemas.openxmlformats.org/drawingml/2006/main" xmlns:r="http://schemas.openxmlformats.org/officeDocument/2006/relationships" xmlns:p="http://schemas.openxmlformats.org/presentationml/2006/main">
-  <p:cSld>
-    <p:spTree>
-      <p:nvGrpSpPr>
-        <p:cNvPr id="1" name=""/>
-        <p:cNvGrpSpPr/>
-        <p:nvPr/>
-      </p:nvGrpSpPr>
-      <p:grpSpPr>
-        <a:xfrm>
-          <a:off x="0" y="0"/>
-          <a:ext cx="0" cy="0"/>
-          <a:chOff x="0" y="0"/>
-          <a:chExt cx="0" cy="0"/>
-        </a:xfrm>
-      </p:grpSpPr>
-      <p:sp>
-        <p:nvSpPr>
-          <p:cNvPr id="7" name="TextBox 6">
-            <a:extLst>
-              <a:ext uri="{FF2B5EF4-FFF2-40B4-BE49-F238E27FC236}">
-                <a16:creationId xmlns:a16="http://schemas.microsoft.com/office/drawing/2014/main" id="{8D652E1B-EAF7-4D08-B3E2-2F133DC81CD4}"/>
-              </a:ext>
-            </a:extLst>
-          </p:cNvPr>
-          <p:cNvSpPr txBox="1"/>
-          <p:nvPr/>
-        </p:nvSpPr>
-        <p:spPr>
-          <a:xfrm>
-            <a:off x="0" y="-1"/>
             <a:ext cx="3308279" cy="954107"/>
           </a:xfrm>
           <a:prstGeom prst="rect">
@@ -23242,7 +22490,429 @@
 </p:sld>
 </file>
 
-<file path=ppt/slides/slide21.xml><?xml version="1.0" encoding="utf-8"?>
+<file path=ppt/slides/slide2.xml><?xml version="1.0" encoding="utf-8"?>
+<p:sld xmlns:a="http://schemas.openxmlformats.org/drawingml/2006/main" xmlns:r="http://schemas.openxmlformats.org/officeDocument/2006/relationships" xmlns:p="http://schemas.openxmlformats.org/presentationml/2006/main">
+  <p:cSld>
+    <p:spTree>
+      <p:nvGrpSpPr>
+        <p:cNvPr id="1" name=""/>
+        <p:cNvGrpSpPr/>
+        <p:nvPr/>
+      </p:nvGrpSpPr>
+      <p:grpSpPr>
+        <a:xfrm>
+          <a:off x="0" y="0"/>
+          <a:ext cx="0" cy="0"/>
+          <a:chOff x="0" y="0"/>
+          <a:chExt cx="0" cy="0"/>
+        </a:xfrm>
+      </p:grpSpPr>
+      <p:sp>
+        <p:nvSpPr>
+          <p:cNvPr id="7" name="TextBox 6">
+            <a:extLst>
+              <a:ext uri="{FF2B5EF4-FFF2-40B4-BE49-F238E27FC236}">
+                <a16:creationId xmlns:a16="http://schemas.microsoft.com/office/drawing/2014/main" id="{8D652E1B-EAF7-4D08-B3E2-2F133DC81CD4}"/>
+              </a:ext>
+            </a:extLst>
+          </p:cNvPr>
+          <p:cNvSpPr txBox="1"/>
+          <p:nvPr/>
+        </p:nvSpPr>
+        <p:spPr>
+          <a:xfrm>
+            <a:off x="0" y="-1"/>
+            <a:ext cx="3308279" cy="523220"/>
+          </a:xfrm>
+          <a:prstGeom prst="rect">
+            <a:avLst/>
+          </a:prstGeom>
+          <a:noFill/>
+        </p:spPr>
+        <p:txBody>
+          <a:bodyPr wrap="square" rtlCol="0">
+            <a:spAutoFit/>
+          </a:bodyPr>
+          <a:lstStyle/>
+          <a:p>
+            <a:r>
+              <a:rPr lang="en-US" sz="2800" b="1" i="1" u="sng" dirty="0">
+                <a:solidFill>
+                  <a:schemeClr val="accent1">
+                    <a:lumMod val="75000"/>
+                  </a:schemeClr>
+                </a:solidFill>
+              </a:rPr>
+              <a:t>ESP (70001256)</a:t>
+            </a:r>
+          </a:p>
+        </p:txBody>
+      </p:sp>
+      <p:grpSp>
+        <p:nvGrpSpPr>
+          <p:cNvPr id="2" name="Grupo 1">
+            <a:extLst>
+              <a:ext uri="{FF2B5EF4-FFF2-40B4-BE49-F238E27FC236}">
+                <a16:creationId xmlns:a16="http://schemas.microsoft.com/office/drawing/2014/main" id="{6E41A3D0-146B-ACBB-4987-430E9390D928}"/>
+              </a:ext>
+            </a:extLst>
+          </p:cNvPr>
+          <p:cNvGrpSpPr/>
+          <p:nvPr/>
+        </p:nvGrpSpPr>
+        <p:grpSpPr>
+          <a:xfrm>
+            <a:off x="3446318" y="0"/>
+            <a:ext cx="5299364" cy="6858000"/>
+            <a:chOff x="3446318" y="0"/>
+            <a:chExt cx="5299364" cy="6858000"/>
+          </a:xfrm>
+        </p:grpSpPr>
+        <p:pic>
+          <p:nvPicPr>
+            <p:cNvPr id="3" name="Picture 2">
+              <a:extLst>
+                <a:ext uri="{FF2B5EF4-FFF2-40B4-BE49-F238E27FC236}">
+                  <a16:creationId xmlns:a16="http://schemas.microsoft.com/office/drawing/2014/main" id="{85C88064-A869-4CA5-85C0-D8137EF263D9}"/>
+                </a:ext>
+              </a:extLst>
+            </p:cNvPr>
+            <p:cNvPicPr>
+              <a:picLocks noChangeAspect="1"/>
+            </p:cNvPicPr>
+            <p:nvPr/>
+          </p:nvPicPr>
+          <p:blipFill>
+            <a:blip r:embed="rId2">
+              <a:extLst>
+                <a:ext uri="{28A0092B-C50C-407E-A947-70E740481C1C}">
+                  <a14:useLocalDpi xmlns:a14="http://schemas.microsoft.com/office/drawing/2010/main" val="0"/>
+                </a:ext>
+              </a:extLst>
+            </a:blip>
+            <a:stretch>
+              <a:fillRect/>
+            </a:stretch>
+          </p:blipFill>
+          <p:spPr>
+            <a:xfrm>
+              <a:off x="3446318" y="0"/>
+              <a:ext cx="5299364" cy="6858000"/>
+            </a:xfrm>
+            <a:prstGeom prst="rect">
+              <a:avLst/>
+            </a:prstGeom>
+          </p:spPr>
+        </p:pic>
+        <p:sp>
+          <p:nvSpPr>
+            <p:cNvPr id="6" name="Rectangle 5">
+              <a:extLst>
+                <a:ext uri="{FF2B5EF4-FFF2-40B4-BE49-F238E27FC236}">
+                  <a16:creationId xmlns:a16="http://schemas.microsoft.com/office/drawing/2014/main" id="{5CAAD90B-7282-4CB1-8113-9C1F00CD5391}"/>
+                </a:ext>
+              </a:extLst>
+            </p:cNvPr>
+            <p:cNvSpPr/>
+            <p:nvPr/>
+          </p:nvSpPr>
+          <p:spPr>
+            <a:xfrm>
+              <a:off x="7512050" y="584201"/>
+              <a:ext cx="387350" cy="133350"/>
+            </a:xfrm>
+            <a:prstGeom prst="rect">
+              <a:avLst/>
+            </a:prstGeom>
+            <a:noFill/>
+            <a:ln w="19050"/>
+          </p:spPr>
+          <p:style>
+            <a:lnRef idx="2">
+              <a:schemeClr val="accent1">
+                <a:shade val="50000"/>
+              </a:schemeClr>
+            </a:lnRef>
+            <a:fillRef idx="1">
+              <a:schemeClr val="accent1"/>
+            </a:fillRef>
+            <a:effectRef idx="0">
+              <a:schemeClr val="accent1"/>
+            </a:effectRef>
+            <a:fontRef idx="minor">
+              <a:schemeClr val="lt1"/>
+            </a:fontRef>
+          </p:style>
+          <p:txBody>
+            <a:bodyPr rtlCol="0" anchor="ctr"/>
+            <a:lstStyle/>
+            <a:p>
+              <a:pPr algn="ctr"/>
+              <a:endParaRPr lang="es-ES" dirty="0"/>
+            </a:p>
+          </p:txBody>
+        </p:sp>
+        <p:sp>
+          <p:nvSpPr>
+            <p:cNvPr id="11" name="Rectangle 10">
+              <a:extLst>
+                <a:ext uri="{FF2B5EF4-FFF2-40B4-BE49-F238E27FC236}">
+                  <a16:creationId xmlns:a16="http://schemas.microsoft.com/office/drawing/2014/main" id="{CEAB13F5-8287-4A92-8D86-E340395E699E}"/>
+                </a:ext>
+              </a:extLst>
+            </p:cNvPr>
+            <p:cNvSpPr/>
+            <p:nvPr/>
+          </p:nvSpPr>
+          <p:spPr>
+            <a:xfrm>
+              <a:off x="5095875" y="3660775"/>
+              <a:ext cx="530225" cy="117475"/>
+            </a:xfrm>
+            <a:prstGeom prst="rect">
+              <a:avLst/>
+            </a:prstGeom>
+            <a:noFill/>
+            <a:ln w="19050"/>
+          </p:spPr>
+          <p:style>
+            <a:lnRef idx="2">
+              <a:schemeClr val="accent2">
+                <a:shade val="50000"/>
+              </a:schemeClr>
+            </a:lnRef>
+            <a:fillRef idx="1">
+              <a:schemeClr val="accent2"/>
+            </a:fillRef>
+            <a:effectRef idx="0">
+              <a:schemeClr val="accent2"/>
+            </a:effectRef>
+            <a:fontRef idx="minor">
+              <a:schemeClr val="lt1"/>
+            </a:fontRef>
+          </p:style>
+          <p:txBody>
+            <a:bodyPr rtlCol="0" anchor="ctr"/>
+            <a:lstStyle/>
+            <a:p>
+              <a:pPr algn="ctr"/>
+              <a:endParaRPr lang="es-ES" dirty="0"/>
+            </a:p>
+          </p:txBody>
+        </p:sp>
+        <p:sp>
+          <p:nvSpPr>
+            <p:cNvPr id="12" name="Rectangle 11">
+              <a:extLst>
+                <a:ext uri="{FF2B5EF4-FFF2-40B4-BE49-F238E27FC236}">
+                  <a16:creationId xmlns:a16="http://schemas.microsoft.com/office/drawing/2014/main" id="{EBF2A621-5DCB-44CD-80F4-527646BE8979}"/>
+                </a:ext>
+              </a:extLst>
+            </p:cNvPr>
+            <p:cNvSpPr/>
+            <p:nvPr/>
+          </p:nvSpPr>
+          <p:spPr>
+            <a:xfrm>
+              <a:off x="3880882" y="3660775"/>
+              <a:ext cx="297418" cy="90187"/>
+            </a:xfrm>
+            <a:prstGeom prst="rect">
+              <a:avLst/>
+            </a:prstGeom>
+            <a:noFill/>
+            <a:ln w="19050"/>
+          </p:spPr>
+          <p:style>
+            <a:lnRef idx="2">
+              <a:schemeClr val="accent3">
+                <a:shade val="50000"/>
+              </a:schemeClr>
+            </a:lnRef>
+            <a:fillRef idx="1">
+              <a:schemeClr val="accent3"/>
+            </a:fillRef>
+            <a:effectRef idx="0">
+              <a:schemeClr val="accent3"/>
+            </a:effectRef>
+            <a:fontRef idx="minor">
+              <a:schemeClr val="lt1"/>
+            </a:fontRef>
+          </p:style>
+          <p:txBody>
+            <a:bodyPr rtlCol="0" anchor="ctr"/>
+            <a:lstStyle/>
+            <a:p>
+              <a:pPr algn="ctr"/>
+              <a:endParaRPr lang="es-ES" dirty="0"/>
+            </a:p>
+          </p:txBody>
+        </p:sp>
+        <p:sp>
+          <p:nvSpPr>
+            <p:cNvPr id="13" name="Rectangle 12">
+              <a:extLst>
+                <a:ext uri="{FF2B5EF4-FFF2-40B4-BE49-F238E27FC236}">
+                  <a16:creationId xmlns:a16="http://schemas.microsoft.com/office/drawing/2014/main" id="{2047952B-59FF-463D-A31B-78299011C89A}"/>
+                </a:ext>
+              </a:extLst>
+            </p:cNvPr>
+            <p:cNvSpPr/>
+            <p:nvPr/>
+          </p:nvSpPr>
+          <p:spPr>
+            <a:xfrm>
+              <a:off x="4270380" y="3660775"/>
+              <a:ext cx="345664" cy="90187"/>
+            </a:xfrm>
+            <a:prstGeom prst="rect">
+              <a:avLst/>
+            </a:prstGeom>
+            <a:noFill/>
+            <a:ln w="19050">
+              <a:solidFill>
+                <a:schemeClr val="accent4">
+                  <a:lumMod val="75000"/>
+                </a:schemeClr>
+              </a:solidFill>
+            </a:ln>
+          </p:spPr>
+          <p:style>
+            <a:lnRef idx="2">
+              <a:schemeClr val="accent5">
+                <a:shade val="50000"/>
+              </a:schemeClr>
+            </a:lnRef>
+            <a:fillRef idx="1">
+              <a:schemeClr val="accent5"/>
+            </a:fillRef>
+            <a:effectRef idx="0">
+              <a:schemeClr val="accent5"/>
+            </a:effectRef>
+            <a:fontRef idx="minor">
+              <a:schemeClr val="lt1"/>
+            </a:fontRef>
+          </p:style>
+          <p:txBody>
+            <a:bodyPr rtlCol="0" anchor="ctr"/>
+            <a:lstStyle/>
+            <a:p>
+              <a:pPr algn="ctr"/>
+              <a:endParaRPr lang="es-ES" dirty="0"/>
+            </a:p>
+          </p:txBody>
+        </p:sp>
+      </p:grpSp>
+      <p:sp>
+        <p:nvSpPr>
+          <p:cNvPr id="9" name="Rectángulo 8">
+            <a:extLst>
+              <a:ext uri="{FF2B5EF4-FFF2-40B4-BE49-F238E27FC236}">
+                <a16:creationId xmlns:a16="http://schemas.microsoft.com/office/drawing/2014/main" id="{BB415FAF-9663-4C3B-9ECD-8A8F669052EB}"/>
+              </a:ext>
+            </a:extLst>
+          </p:cNvPr>
+          <p:cNvSpPr/>
+          <p:nvPr/>
+        </p:nvSpPr>
+        <p:spPr>
+          <a:xfrm>
+            <a:off x="9965933" y="5384832"/>
+            <a:ext cx="1828800" cy="697469"/>
+          </a:xfrm>
+          <a:prstGeom prst="rect">
+            <a:avLst/>
+          </a:prstGeom>
+          <a:solidFill>
+            <a:schemeClr val="accent4">
+              <a:lumMod val="75000"/>
+            </a:schemeClr>
+          </a:solidFill>
+          <a:ln>
+            <a:noFill/>
+          </a:ln>
+        </p:spPr>
+        <p:style>
+          <a:lnRef idx="2">
+            <a:schemeClr val="accent1">
+              <a:shade val="50000"/>
+            </a:schemeClr>
+          </a:lnRef>
+          <a:fillRef idx="1">
+            <a:schemeClr val="accent1"/>
+          </a:fillRef>
+          <a:effectRef idx="0">
+            <a:schemeClr val="accent1"/>
+          </a:effectRef>
+          <a:fontRef idx="minor">
+            <a:schemeClr val="lt1"/>
+          </a:fontRef>
+        </p:style>
+        <p:txBody>
+          <a:bodyPr rtlCol="0" anchor="ctr"/>
+          <a:lstStyle/>
+          <a:p>
+            <a:pPr algn="ctr"/>
+            <a:r>
+              <a:rPr lang="es-ES" sz="2000" dirty="0"/>
+              <a:t>No escaneado</a:t>
+            </a:r>
+          </a:p>
+        </p:txBody>
+      </p:sp>
+      <p:pic>
+        <p:nvPicPr>
+          <p:cNvPr id="14" name="Gráfico 13" descr="Marca de verificación con relleno sólido">
+            <a:extLst>
+              <a:ext uri="{FF2B5EF4-FFF2-40B4-BE49-F238E27FC236}">
+                <a16:creationId xmlns:a16="http://schemas.microsoft.com/office/drawing/2014/main" id="{5B804FA4-D8BD-3922-35AA-8A3470493487}"/>
+              </a:ext>
+            </a:extLst>
+          </p:cNvPr>
+          <p:cNvPicPr>
+            <a:picLocks noChangeAspect="1"/>
+          </p:cNvPicPr>
+          <p:nvPr/>
+        </p:nvPicPr>
+        <p:blipFill>
+          <a:blip r:embed="rId3">
+            <a:extLst>
+              <a:ext uri="{28A0092B-C50C-407E-A947-70E740481C1C}">
+                <a14:useLocalDpi xmlns:a14="http://schemas.microsoft.com/office/drawing/2010/main" val="0"/>
+              </a:ext>
+              <a:ext uri="{96DAC541-7B7A-43D3-8B79-37D633B846F1}">
+                <asvg:svgBlip xmlns:asvg="http://schemas.microsoft.com/office/drawing/2016/SVG/main" r:embed="rId4"/>
+              </a:ext>
+            </a:extLst>
+          </a:blip>
+          <a:stretch>
+            <a:fillRect/>
+          </a:stretch>
+        </p:blipFill>
+        <p:spPr>
+          <a:xfrm>
+            <a:off x="8895650" y="431033"/>
+            <a:ext cx="914400" cy="914400"/>
+          </a:xfrm>
+          <a:prstGeom prst="rect">
+            <a:avLst/>
+          </a:prstGeom>
+        </p:spPr>
+      </p:pic>
+    </p:spTree>
+    <p:extLst>
+      <p:ext uri="{BB962C8B-B14F-4D97-AF65-F5344CB8AC3E}">
+        <p14:creationId xmlns:p14="http://schemas.microsoft.com/office/powerpoint/2010/main" val="934720096"/>
+      </p:ext>
+    </p:extLst>
+  </p:cSld>
+  <p:clrMapOvr>
+    <a:masterClrMapping/>
+  </p:clrMapOvr>
+</p:sld>
+</file>
+
+<file path=ppt/slides/slide20.xml><?xml version="1.0" encoding="utf-8"?>
 <p:sld xmlns:a="http://schemas.openxmlformats.org/drawingml/2006/main" xmlns:r="http://schemas.openxmlformats.org/officeDocument/2006/relationships" xmlns:p="http://schemas.openxmlformats.org/presentationml/2006/main">
   <p:cSld>
     <p:spTree>
@@ -23579,6 +23249,45 @@
           </a:p>
         </p:txBody>
       </p:sp>
+      <p:pic>
+        <p:nvPicPr>
+          <p:cNvPr id="2" name="Gráfico 1" descr="Marca de verificación con relleno sólido">
+            <a:extLst>
+              <a:ext uri="{FF2B5EF4-FFF2-40B4-BE49-F238E27FC236}">
+                <a16:creationId xmlns:a16="http://schemas.microsoft.com/office/drawing/2014/main" id="{67C74156-0574-F5E5-3142-E5471DB011A6}"/>
+              </a:ext>
+            </a:extLst>
+          </p:cNvPr>
+          <p:cNvPicPr>
+            <a:picLocks noChangeAspect="1"/>
+          </p:cNvPicPr>
+          <p:nvPr/>
+        </p:nvPicPr>
+        <p:blipFill>
+          <a:blip r:embed="rId3">
+            <a:extLst>
+              <a:ext uri="{28A0092B-C50C-407E-A947-70E740481C1C}">
+                <a14:useLocalDpi xmlns:a14="http://schemas.microsoft.com/office/drawing/2010/main" val="0"/>
+              </a:ext>
+              <a:ext uri="{96DAC541-7B7A-43D3-8B79-37D633B846F1}">
+                <asvg:svgBlip xmlns:asvg="http://schemas.microsoft.com/office/drawing/2016/SVG/main" r:embed="rId4"/>
+              </a:ext>
+            </a:extLst>
+          </a:blip>
+          <a:stretch>
+            <a:fillRect/>
+          </a:stretch>
+        </p:blipFill>
+        <p:spPr>
+          <a:xfrm>
+            <a:off x="8895650" y="431033"/>
+            <a:ext cx="914400" cy="914400"/>
+          </a:xfrm>
+          <a:prstGeom prst="rect">
+            <a:avLst/>
+          </a:prstGeom>
+        </p:spPr>
+      </p:pic>
     </p:spTree>
     <p:extLst>
       <p:ext uri="{BB962C8B-B14F-4D97-AF65-F5344CB8AC3E}">
@@ -23592,7 +23301,7 @@
 </p:sld>
 </file>
 
-<file path=ppt/slides/slide22.xml><?xml version="1.0" encoding="utf-8"?>
+<file path=ppt/slides/slide21.xml><?xml version="1.0" encoding="utf-8"?>
 <p:sld xmlns:a="http://schemas.openxmlformats.org/drawingml/2006/main" xmlns:r="http://schemas.openxmlformats.org/officeDocument/2006/relationships" xmlns:p="http://schemas.openxmlformats.org/presentationml/2006/main">
   <p:cSld>
     <p:spTree>
@@ -23942,7 +23651,7 @@
 </p:sld>
 </file>
 
-<file path=ppt/slides/slide23.xml><?xml version="1.0" encoding="utf-8"?>
+<file path=ppt/slides/slide22.xml><?xml version="1.0" encoding="utf-8"?>
 <p:sld xmlns:a="http://schemas.openxmlformats.org/drawingml/2006/main" xmlns:r="http://schemas.openxmlformats.org/officeDocument/2006/relationships" xmlns:p="http://schemas.openxmlformats.org/presentationml/2006/main">
   <p:cSld>
     <p:spTree>
@@ -24279,6 +23988,45 @@
           </a:p>
         </p:txBody>
       </p:sp>
+      <p:pic>
+        <p:nvPicPr>
+          <p:cNvPr id="2" name="Gráfico 1" descr="Marca de verificación con relleno sólido">
+            <a:extLst>
+              <a:ext uri="{FF2B5EF4-FFF2-40B4-BE49-F238E27FC236}">
+                <a16:creationId xmlns:a16="http://schemas.microsoft.com/office/drawing/2014/main" id="{8A42C233-4E6E-0284-91F8-B19411BF9410}"/>
+              </a:ext>
+            </a:extLst>
+          </p:cNvPr>
+          <p:cNvPicPr>
+            <a:picLocks noChangeAspect="1"/>
+          </p:cNvPicPr>
+          <p:nvPr/>
+        </p:nvPicPr>
+        <p:blipFill>
+          <a:blip r:embed="rId3">
+            <a:extLst>
+              <a:ext uri="{28A0092B-C50C-407E-A947-70E740481C1C}">
+                <a14:useLocalDpi xmlns:a14="http://schemas.microsoft.com/office/drawing/2010/main" val="0"/>
+              </a:ext>
+              <a:ext uri="{96DAC541-7B7A-43D3-8B79-37D633B846F1}">
+                <asvg:svgBlip xmlns:asvg="http://schemas.microsoft.com/office/drawing/2016/SVG/main" r:embed="rId4"/>
+              </a:ext>
+            </a:extLst>
+          </a:blip>
+          <a:stretch>
+            <a:fillRect/>
+          </a:stretch>
+        </p:blipFill>
+        <p:spPr>
+          <a:xfrm>
+            <a:off x="8895650" y="431033"/>
+            <a:ext cx="914400" cy="914400"/>
+          </a:xfrm>
+          <a:prstGeom prst="rect">
+            <a:avLst/>
+          </a:prstGeom>
+        </p:spPr>
+      </p:pic>
     </p:spTree>
     <p:extLst>
       <p:ext uri="{BB962C8B-B14F-4D97-AF65-F5344CB8AC3E}">
@@ -24292,7 +24040,7 @@
 </p:sld>
 </file>
 
-<file path=ppt/slides/slide24.xml><?xml version="1.0" encoding="utf-8"?>
+<file path=ppt/slides/slide23.xml><?xml version="1.0" encoding="utf-8"?>
 <p:sld xmlns:a="http://schemas.openxmlformats.org/drawingml/2006/main" xmlns:r="http://schemas.openxmlformats.org/officeDocument/2006/relationships" xmlns:p="http://schemas.openxmlformats.org/presentationml/2006/main">
   <p:cSld>
     <p:spTree>
@@ -24639,6 +24387,45 @@
           </a:p>
         </p:txBody>
       </p:sp>
+      <p:pic>
+        <p:nvPicPr>
+          <p:cNvPr id="2" name="Gráfico 1" descr="Marca de verificación con relleno sólido">
+            <a:extLst>
+              <a:ext uri="{FF2B5EF4-FFF2-40B4-BE49-F238E27FC236}">
+                <a16:creationId xmlns:a16="http://schemas.microsoft.com/office/drawing/2014/main" id="{BC77570C-3CF1-2BCC-78FD-806ACA25BB47}"/>
+              </a:ext>
+            </a:extLst>
+          </p:cNvPr>
+          <p:cNvPicPr>
+            <a:picLocks noChangeAspect="1"/>
+          </p:cNvPicPr>
+          <p:nvPr/>
+        </p:nvPicPr>
+        <p:blipFill>
+          <a:blip r:embed="rId3">
+            <a:extLst>
+              <a:ext uri="{28A0092B-C50C-407E-A947-70E740481C1C}">
+                <a14:useLocalDpi xmlns:a14="http://schemas.microsoft.com/office/drawing/2010/main" val="0"/>
+              </a:ext>
+              <a:ext uri="{96DAC541-7B7A-43D3-8B79-37D633B846F1}">
+                <asvg:svgBlip xmlns:asvg="http://schemas.microsoft.com/office/drawing/2016/SVG/main" r:embed="rId4"/>
+              </a:ext>
+            </a:extLst>
+          </a:blip>
+          <a:stretch>
+            <a:fillRect/>
+          </a:stretch>
+        </p:blipFill>
+        <p:spPr>
+          <a:xfrm>
+            <a:off x="8895650" y="431033"/>
+            <a:ext cx="914400" cy="914400"/>
+          </a:xfrm>
+          <a:prstGeom prst="rect">
+            <a:avLst/>
+          </a:prstGeom>
+        </p:spPr>
+      </p:pic>
     </p:spTree>
     <p:extLst>
       <p:ext uri="{BB962C8B-B14F-4D97-AF65-F5344CB8AC3E}">
@@ -24652,7 +24439,7 @@
 </p:sld>
 </file>
 
-<file path=ppt/slides/slide25.xml><?xml version="1.0" encoding="utf-8"?>
+<file path=ppt/slides/slide24.xml><?xml version="1.0" encoding="utf-8"?>
 <p:sld xmlns:a="http://schemas.openxmlformats.org/drawingml/2006/main" xmlns:r="http://schemas.openxmlformats.org/officeDocument/2006/relationships" xmlns:p="http://schemas.openxmlformats.org/presentationml/2006/main">
   <p:cSld>
     <p:spTree>
@@ -24955,6 +24742,360 @@
     <p:extLst>
       <p:ext uri="{BB962C8B-B14F-4D97-AF65-F5344CB8AC3E}">
         <p14:creationId xmlns:p14="http://schemas.microsoft.com/office/powerpoint/2010/main" val="197015515"/>
+      </p:ext>
+    </p:extLst>
+  </p:cSld>
+  <p:clrMapOvr>
+    <a:masterClrMapping/>
+  </p:clrMapOvr>
+</p:sld>
+</file>
+
+<file path=ppt/slides/slide25.xml><?xml version="1.0" encoding="utf-8"?>
+<p:sld xmlns:a="http://schemas.openxmlformats.org/drawingml/2006/main" xmlns:r="http://schemas.openxmlformats.org/officeDocument/2006/relationships" xmlns:p="http://schemas.openxmlformats.org/presentationml/2006/main">
+  <p:cSld>
+    <p:spTree>
+      <p:nvGrpSpPr>
+        <p:cNvPr id="1" name=""/>
+        <p:cNvGrpSpPr/>
+        <p:nvPr/>
+      </p:nvGrpSpPr>
+      <p:grpSpPr>
+        <a:xfrm>
+          <a:off x="0" y="0"/>
+          <a:ext cx="0" cy="0"/>
+          <a:chOff x="0" y="0"/>
+          <a:chExt cx="0" cy="0"/>
+        </a:xfrm>
+      </p:grpSpPr>
+      <p:sp>
+        <p:nvSpPr>
+          <p:cNvPr id="7" name="TextBox 6">
+            <a:extLst>
+              <a:ext uri="{FF2B5EF4-FFF2-40B4-BE49-F238E27FC236}">
+                <a16:creationId xmlns:a16="http://schemas.microsoft.com/office/drawing/2014/main" id="{8D652E1B-EAF7-4D08-B3E2-2F133DC81CD4}"/>
+              </a:ext>
+            </a:extLst>
+          </p:cNvPr>
+          <p:cNvSpPr txBox="1"/>
+          <p:nvPr/>
+        </p:nvSpPr>
+        <p:spPr>
+          <a:xfrm>
+            <a:off x="0" y="-1"/>
+            <a:ext cx="3308279" cy="523220"/>
+          </a:xfrm>
+          <a:prstGeom prst="rect">
+            <a:avLst/>
+          </a:prstGeom>
+          <a:noFill/>
+        </p:spPr>
+        <p:txBody>
+          <a:bodyPr wrap="square" rtlCol="0">
+            <a:spAutoFit/>
+          </a:bodyPr>
+          <a:lstStyle/>
+          <a:p>
+            <a:r>
+              <a:rPr lang="en-US" sz="2800" b="1" i="1" u="sng" dirty="0">
+                <a:solidFill>
+                  <a:schemeClr val="accent1">
+                    <a:lumMod val="75000"/>
+                  </a:schemeClr>
+                </a:solidFill>
+              </a:rPr>
+              <a:t>Danfoss (70013219)</a:t>
+            </a:r>
+          </a:p>
+        </p:txBody>
+      </p:sp>
+      <p:pic>
+        <p:nvPicPr>
+          <p:cNvPr id="3" name="Picture 2" descr="A picture containing text, receipt, screenshot&#10;&#10;Description automatically generated">
+            <a:extLst>
+              <a:ext uri="{FF2B5EF4-FFF2-40B4-BE49-F238E27FC236}">
+                <a16:creationId xmlns:a16="http://schemas.microsoft.com/office/drawing/2014/main" id="{D478DBF4-0852-429E-9F9E-C991D15FC989}"/>
+              </a:ext>
+            </a:extLst>
+          </p:cNvPr>
+          <p:cNvPicPr>
+            <a:picLocks noChangeAspect="1"/>
+          </p:cNvPicPr>
+          <p:nvPr/>
+        </p:nvPicPr>
+        <p:blipFill>
+          <a:blip r:embed="rId2">
+            <a:extLst>
+              <a:ext uri="{28A0092B-C50C-407E-A947-70E740481C1C}">
+                <a14:useLocalDpi xmlns:a14="http://schemas.microsoft.com/office/drawing/2010/main" val="0"/>
+              </a:ext>
+            </a:extLst>
+          </a:blip>
+          <a:stretch>
+            <a:fillRect/>
+          </a:stretch>
+        </p:blipFill>
+        <p:spPr>
+          <a:xfrm>
+            <a:off x="3446318" y="0"/>
+            <a:ext cx="5299364" cy="6858000"/>
+          </a:xfrm>
+          <a:prstGeom prst="rect">
+            <a:avLst/>
+          </a:prstGeom>
+        </p:spPr>
+      </p:pic>
+      <p:sp>
+        <p:nvSpPr>
+          <p:cNvPr id="6" name="Rectangle 5">
+            <a:extLst>
+              <a:ext uri="{FF2B5EF4-FFF2-40B4-BE49-F238E27FC236}">
+                <a16:creationId xmlns:a16="http://schemas.microsoft.com/office/drawing/2014/main" id="{65F7D1BF-8C2A-4388-9DFF-442668718908}"/>
+              </a:ext>
+            </a:extLst>
+          </p:cNvPr>
+          <p:cNvSpPr/>
+          <p:nvPr/>
+        </p:nvSpPr>
+        <p:spPr>
+          <a:xfrm>
+            <a:off x="6312023" y="1162975"/>
+            <a:ext cx="621438" cy="159798"/>
+          </a:xfrm>
+          <a:prstGeom prst="rect">
+            <a:avLst/>
+          </a:prstGeom>
+          <a:noFill/>
+          <a:ln w="19050"/>
+        </p:spPr>
+        <p:style>
+          <a:lnRef idx="2">
+            <a:schemeClr val="accent1">
+              <a:shade val="50000"/>
+            </a:schemeClr>
+          </a:lnRef>
+          <a:fillRef idx="1">
+            <a:schemeClr val="accent1"/>
+          </a:fillRef>
+          <a:effectRef idx="0">
+            <a:schemeClr val="accent1"/>
+          </a:effectRef>
+          <a:fontRef idx="minor">
+            <a:schemeClr val="lt1"/>
+          </a:fontRef>
+        </p:style>
+        <p:txBody>
+          <a:bodyPr rtlCol="0" anchor="ctr"/>
+          <a:lstStyle/>
+          <a:p>
+            <a:pPr algn="ctr"/>
+            <a:endParaRPr lang="es-ES" dirty="0"/>
+          </a:p>
+        </p:txBody>
+      </p:sp>
+      <p:sp>
+        <p:nvSpPr>
+          <p:cNvPr id="8" name="Rectangle 7">
+            <a:extLst>
+              <a:ext uri="{FF2B5EF4-FFF2-40B4-BE49-F238E27FC236}">
+                <a16:creationId xmlns:a16="http://schemas.microsoft.com/office/drawing/2014/main" id="{E314069A-7AC2-4FE0-A81D-BA22C6B83599}"/>
+              </a:ext>
+            </a:extLst>
+          </p:cNvPr>
+          <p:cNvSpPr/>
+          <p:nvPr/>
+        </p:nvSpPr>
+        <p:spPr>
+          <a:xfrm>
+            <a:off x="4427220" y="4210163"/>
+            <a:ext cx="220980" cy="125617"/>
+          </a:xfrm>
+          <a:prstGeom prst="rect">
+            <a:avLst/>
+          </a:prstGeom>
+          <a:noFill/>
+          <a:ln w="19050"/>
+        </p:spPr>
+        <p:style>
+          <a:lnRef idx="2">
+            <a:schemeClr val="accent2">
+              <a:shade val="50000"/>
+            </a:schemeClr>
+          </a:lnRef>
+          <a:fillRef idx="1">
+            <a:schemeClr val="accent2"/>
+          </a:fillRef>
+          <a:effectRef idx="0">
+            <a:schemeClr val="accent2"/>
+          </a:effectRef>
+          <a:fontRef idx="minor">
+            <a:schemeClr val="lt1"/>
+          </a:fontRef>
+        </p:style>
+        <p:txBody>
+          <a:bodyPr rtlCol="0" anchor="ctr"/>
+          <a:lstStyle/>
+          <a:p>
+            <a:pPr algn="ctr"/>
+            <a:endParaRPr lang="es-ES" dirty="0"/>
+          </a:p>
+        </p:txBody>
+      </p:sp>
+      <p:sp>
+        <p:nvSpPr>
+          <p:cNvPr id="9" name="Rectangle 8">
+            <a:extLst>
+              <a:ext uri="{FF2B5EF4-FFF2-40B4-BE49-F238E27FC236}">
+                <a16:creationId xmlns:a16="http://schemas.microsoft.com/office/drawing/2014/main" id="{AC698F80-F190-4DC5-8687-3AD4909A8F56}"/>
+              </a:ext>
+            </a:extLst>
+          </p:cNvPr>
+          <p:cNvSpPr/>
+          <p:nvPr/>
+        </p:nvSpPr>
+        <p:spPr>
+          <a:xfrm>
+            <a:off x="5798820" y="4210163"/>
+            <a:ext cx="220980" cy="125617"/>
+          </a:xfrm>
+          <a:prstGeom prst="rect">
+            <a:avLst/>
+          </a:prstGeom>
+          <a:noFill/>
+          <a:ln w="19050"/>
+        </p:spPr>
+        <p:style>
+          <a:lnRef idx="2">
+            <a:schemeClr val="accent3">
+              <a:shade val="50000"/>
+            </a:schemeClr>
+          </a:lnRef>
+          <a:fillRef idx="1">
+            <a:schemeClr val="accent3"/>
+          </a:fillRef>
+          <a:effectRef idx="0">
+            <a:schemeClr val="accent3"/>
+          </a:effectRef>
+          <a:fontRef idx="minor">
+            <a:schemeClr val="lt1"/>
+          </a:fontRef>
+        </p:style>
+        <p:txBody>
+          <a:bodyPr rtlCol="0" anchor="ctr"/>
+          <a:lstStyle/>
+          <a:p>
+            <a:pPr algn="ctr"/>
+            <a:endParaRPr lang="es-ES" dirty="0"/>
+          </a:p>
+        </p:txBody>
+      </p:sp>
+      <p:sp>
+        <p:nvSpPr>
+          <p:cNvPr id="11" name="Rectangle 10">
+            <a:extLst>
+              <a:ext uri="{FF2B5EF4-FFF2-40B4-BE49-F238E27FC236}">
+                <a16:creationId xmlns:a16="http://schemas.microsoft.com/office/drawing/2014/main" id="{C9955A0E-B84D-4A4B-BF09-4D318233ABCA}"/>
+              </a:ext>
+            </a:extLst>
+          </p:cNvPr>
+          <p:cNvSpPr/>
+          <p:nvPr/>
+        </p:nvSpPr>
+        <p:spPr>
+          <a:xfrm>
+            <a:off x="7171382" y="2968103"/>
+            <a:ext cx="601018" cy="163717"/>
+          </a:xfrm>
+          <a:prstGeom prst="rect">
+            <a:avLst/>
+          </a:prstGeom>
+          <a:noFill/>
+          <a:ln w="19050"/>
+        </p:spPr>
+        <p:style>
+          <a:lnRef idx="2">
+            <a:schemeClr val="accent6">
+              <a:shade val="50000"/>
+            </a:schemeClr>
+          </a:lnRef>
+          <a:fillRef idx="1">
+            <a:schemeClr val="accent6"/>
+          </a:fillRef>
+          <a:effectRef idx="0">
+            <a:schemeClr val="accent6"/>
+          </a:effectRef>
+          <a:fontRef idx="minor">
+            <a:schemeClr val="lt1"/>
+          </a:fontRef>
+        </p:style>
+        <p:txBody>
+          <a:bodyPr rtlCol="0" anchor="ctr"/>
+          <a:lstStyle/>
+          <a:p>
+            <a:pPr algn="ctr"/>
+            <a:endParaRPr lang="es-ES" dirty="0"/>
+          </a:p>
+        </p:txBody>
+      </p:sp>
+      <p:sp>
+        <p:nvSpPr>
+          <p:cNvPr id="12" name="Rectángulo 11">
+            <a:extLst>
+              <a:ext uri="{FF2B5EF4-FFF2-40B4-BE49-F238E27FC236}">
+                <a16:creationId xmlns:a16="http://schemas.microsoft.com/office/drawing/2014/main" id="{80730CAE-802C-4708-95F8-903DDC0880F2}"/>
+              </a:ext>
+            </a:extLst>
+          </p:cNvPr>
+          <p:cNvSpPr/>
+          <p:nvPr/>
+        </p:nvSpPr>
+        <p:spPr>
+          <a:xfrm>
+            <a:off x="9965933" y="5384832"/>
+            <a:ext cx="1828800" cy="697469"/>
+          </a:xfrm>
+          <a:prstGeom prst="rect">
+            <a:avLst/>
+          </a:prstGeom>
+          <a:solidFill>
+            <a:schemeClr val="accent6"/>
+          </a:solidFill>
+          <a:ln>
+            <a:noFill/>
+          </a:ln>
+        </p:spPr>
+        <p:style>
+          <a:lnRef idx="2">
+            <a:schemeClr val="accent1">
+              <a:shade val="50000"/>
+            </a:schemeClr>
+          </a:lnRef>
+          <a:fillRef idx="1">
+            <a:schemeClr val="accent1"/>
+          </a:fillRef>
+          <a:effectRef idx="0">
+            <a:schemeClr val="accent1"/>
+          </a:effectRef>
+          <a:fontRef idx="minor">
+            <a:schemeClr val="lt1"/>
+          </a:fontRef>
+        </p:style>
+        <p:txBody>
+          <a:bodyPr rtlCol="0" anchor="ctr"/>
+          <a:lstStyle/>
+          <a:p>
+            <a:pPr algn="ctr"/>
+            <a:r>
+              <a:rPr lang="es-ES" sz="2000" dirty="0"/>
+              <a:t>Escaneado</a:t>
+            </a:r>
+          </a:p>
+        </p:txBody>
+      </p:sp>
+    </p:spTree>
+    <p:extLst>
+      <p:ext uri="{BB962C8B-B14F-4D97-AF65-F5344CB8AC3E}">
+        <p14:creationId xmlns:p14="http://schemas.microsoft.com/office/powerpoint/2010/main" val="3110176351"/>
       </p:ext>
     </p:extLst>
   </p:cSld>

</xml_diff>

<commit_message>
Cambiados codigos SAP de Soucy, JD Israel y Agrostroj
</commit_message>
<xml_diff>
--- a/AI_Engine/Info/ExtraccionDatos.pptx
+++ b/AI_Engine/Info/ExtraccionDatos.pptx
@@ -2709,7 +2709,7 @@
   <pc:docChgLst>
     <pc:chgData name="Gonzalez Diaz Sergio" userId="dac0d5b6-ec0d-43f8-830d-6804c08729bd" providerId="ADAL" clId="{1363879E-5272-4F49-912F-B948C6267803}"/>
     <pc:docChg chg="undo custSel addSld modSld sldOrd addSection delSection modSection">
-      <pc:chgData name="Gonzalez Diaz Sergio" userId="dac0d5b6-ec0d-43f8-830d-6804c08729bd" providerId="ADAL" clId="{1363879E-5272-4F49-912F-B948C6267803}" dt="2022-12-01T09:42:38.940" v="200"/>
+      <pc:chgData name="Gonzalez Diaz Sergio" userId="dac0d5b6-ec0d-43f8-830d-6804c08729bd" providerId="ADAL" clId="{1363879E-5272-4F49-912F-B948C6267803}" dt="2022-12-01T16:01:39.967" v="210"/>
       <pc:docMkLst>
         <pc:docMk/>
       </pc:docMkLst>
@@ -3024,7 +3024,7 @@
         </pc:spChg>
       </pc:sldChg>
       <pc:sldChg chg="addSp delSp modSp add mod">
-        <pc:chgData name="Gonzalez Diaz Sergio" userId="dac0d5b6-ec0d-43f8-830d-6804c08729bd" providerId="ADAL" clId="{1363879E-5272-4F49-912F-B948C6267803}" dt="2022-12-01T09:40:36.981" v="198"/>
+        <pc:chgData name="Gonzalez Diaz Sergio" userId="dac0d5b6-ec0d-43f8-830d-6804c08729bd" providerId="ADAL" clId="{1363879E-5272-4F49-912F-B948C6267803}" dt="2022-12-01T15:58:01.719" v="204"/>
         <pc:sldMkLst>
           <pc:docMk/>
           <pc:sldMk cId="2975466772" sldId="276"/>
@@ -3046,7 +3046,7 @@
           </ac:spMkLst>
         </pc:spChg>
         <pc:spChg chg="mod">
-          <ac:chgData name="Gonzalez Diaz Sergio" userId="dac0d5b6-ec0d-43f8-830d-6804c08729bd" providerId="ADAL" clId="{1363879E-5272-4F49-912F-B948C6267803}" dt="2022-11-30T15:08:28.833" v="62" actId="20577"/>
+          <ac:chgData name="Gonzalez Diaz Sergio" userId="dac0d5b6-ec0d-43f8-830d-6804c08729bd" providerId="ADAL" clId="{1363879E-5272-4F49-912F-B948C6267803}" dt="2022-12-01T15:58:01.719" v="204"/>
           <ac:spMkLst>
             <pc:docMk/>
             <pc:sldMk cId="2975466772" sldId="276"/>
@@ -3119,7 +3119,7 @@
         </pc:picChg>
       </pc:sldChg>
       <pc:sldChg chg="addSp delSp modSp add mod ord">
-        <pc:chgData name="Gonzalez Diaz Sergio" userId="dac0d5b6-ec0d-43f8-830d-6804c08729bd" providerId="ADAL" clId="{1363879E-5272-4F49-912F-B948C6267803}" dt="2022-11-30T15:12:36.531" v="100"/>
+        <pc:chgData name="Gonzalez Diaz Sergio" userId="dac0d5b6-ec0d-43f8-830d-6804c08729bd" providerId="ADAL" clId="{1363879E-5272-4F49-912F-B948C6267803}" dt="2022-12-01T15:58:12.662" v="205"/>
         <pc:sldMkLst>
           <pc:docMk/>
           <pc:sldMk cId="3586918414" sldId="277"/>
@@ -3164,6 +3164,14 @@
             <ac:spMk id="27" creationId="{7676B774-DF1F-DCAC-9C9B-50DA529A9C0E}"/>
           </ac:spMkLst>
         </pc:spChg>
+        <pc:picChg chg="add mod">
+          <ac:chgData name="Gonzalez Diaz Sergio" userId="dac0d5b6-ec0d-43f8-830d-6804c08729bd" providerId="ADAL" clId="{1363879E-5272-4F49-912F-B948C6267803}" dt="2022-12-01T15:58:12.662" v="205"/>
+          <ac:picMkLst>
+            <pc:docMk/>
+            <pc:sldMk cId="3586918414" sldId="277"/>
+            <ac:picMk id="2" creationId="{C78BEB93-7603-7138-6844-F9B93A50E13E}"/>
+          </ac:picMkLst>
+        </pc:picChg>
         <pc:picChg chg="add ord">
           <ac:chgData name="Gonzalez Diaz Sergio" userId="dac0d5b6-ec0d-43f8-830d-6804c08729bd" providerId="ADAL" clId="{1363879E-5272-4F49-912F-B948C6267803}" dt="2022-11-30T15:08:41.305" v="65" actId="167"/>
           <ac:picMkLst>
@@ -3245,13 +3253,13 @@
         </pc:picChg>
       </pc:sldChg>
       <pc:sldChg chg="addSp delSp modSp add mod">
-        <pc:chgData name="Gonzalez Diaz Sergio" userId="dac0d5b6-ec0d-43f8-830d-6804c08729bd" providerId="ADAL" clId="{1363879E-5272-4F49-912F-B948C6267803}" dt="2022-12-01T09:42:38.940" v="200"/>
+        <pc:chgData name="Gonzalez Diaz Sergio" userId="dac0d5b6-ec0d-43f8-830d-6804c08729bd" providerId="ADAL" clId="{1363879E-5272-4F49-912F-B948C6267803}" dt="2022-12-01T16:01:39.967" v="210"/>
         <pc:sldMkLst>
           <pc:docMk/>
           <pc:sldMk cId="3778647813" sldId="279"/>
         </pc:sldMkLst>
         <pc:spChg chg="mod">
-          <ac:chgData name="Gonzalez Diaz Sergio" userId="dac0d5b6-ec0d-43f8-830d-6804c08729bd" providerId="ADAL" clId="{1363879E-5272-4F49-912F-B948C6267803}" dt="2022-11-30T15:12:51.852" v="114" actId="20577"/>
+          <ac:chgData name="Gonzalez Diaz Sergio" userId="dac0d5b6-ec0d-43f8-830d-6804c08729bd" providerId="ADAL" clId="{1363879E-5272-4F49-912F-B948C6267803}" dt="2022-12-01T16:01:39.967" v="210"/>
           <ac:spMkLst>
             <pc:docMk/>
             <pc:sldMk cId="3778647813" sldId="279"/>
@@ -3316,11 +3324,19 @@
         </pc:picChg>
       </pc:sldChg>
       <pc:sldChg chg="addSp delSp modSp add mod">
-        <pc:chgData name="Gonzalez Diaz Sergio" userId="dac0d5b6-ec0d-43f8-830d-6804c08729bd" providerId="ADAL" clId="{1363879E-5272-4F49-912F-B948C6267803}" dt="2022-11-30T15:15:06.834" v="160" actId="1037"/>
+        <pc:chgData name="Gonzalez Diaz Sergio" userId="dac0d5b6-ec0d-43f8-830d-6804c08729bd" providerId="ADAL" clId="{1363879E-5272-4F49-912F-B948C6267803}" dt="2022-12-01T16:01:33.524" v="208"/>
         <pc:sldMkLst>
           <pc:docMk/>
           <pc:sldMk cId="197015515" sldId="280"/>
         </pc:sldMkLst>
+        <pc:spChg chg="mod">
+          <ac:chgData name="Gonzalez Diaz Sergio" userId="dac0d5b6-ec0d-43f8-830d-6804c08729bd" providerId="ADAL" clId="{1363879E-5272-4F49-912F-B948C6267803}" dt="2022-12-01T16:01:33.524" v="208"/>
+          <ac:spMkLst>
+            <pc:docMk/>
+            <pc:sldMk cId="197015515" sldId="280"/>
+            <ac:spMk id="7" creationId="{8D652E1B-EAF7-4D08-B3E2-2F133DC81CD4}"/>
+          </ac:spMkLst>
+        </pc:spChg>
         <pc:spChg chg="del">
           <ac:chgData name="Gonzalez Diaz Sergio" userId="dac0d5b6-ec0d-43f8-830d-6804c08729bd" providerId="ADAL" clId="{1363879E-5272-4F49-912F-B948C6267803}" dt="2022-11-30T15:14:46.404" v="147" actId="478"/>
           <ac:spMkLst>
@@ -3353,6 +3369,14 @@
             <ac:spMk id="27" creationId="{7676B774-DF1F-DCAC-9C9B-50DA529A9C0E}"/>
           </ac:spMkLst>
         </pc:spChg>
+        <pc:picChg chg="add mod">
+          <ac:chgData name="Gonzalez Diaz Sergio" userId="dac0d5b6-ec0d-43f8-830d-6804c08729bd" providerId="ADAL" clId="{1363879E-5272-4F49-912F-B948C6267803}" dt="2022-12-01T15:58:42.060" v="206"/>
+          <ac:picMkLst>
+            <pc:docMk/>
+            <pc:sldMk cId="197015515" sldId="280"/>
+            <ac:picMk id="2" creationId="{E493ED13-7524-F46B-4E04-5F7D46181757}"/>
+          </ac:picMkLst>
+        </pc:picChg>
         <pc:picChg chg="del">
           <ac:chgData name="Gonzalez Diaz Sergio" userId="dac0d5b6-ec0d-43f8-830d-6804c08729bd" providerId="ADAL" clId="{1363879E-5272-4F49-912F-B948C6267803}" dt="2022-11-30T15:14:38.854" v="144" actId="478"/>
           <ac:picMkLst>
@@ -22965,7 +22989,7 @@
                   </a:schemeClr>
                 </a:solidFill>
               </a:rPr>
-              <a:t>Soucy (?)</a:t>
+              <a:t>Soucy (70018728)</a:t>
             </a:r>
           </a:p>
         </p:txBody>
@@ -23638,6 +23662,45 @@
           </a:p>
         </p:txBody>
       </p:sp>
+      <p:pic>
+        <p:nvPicPr>
+          <p:cNvPr id="2" name="Gráfico 1" descr="Marca de verificación con relleno sólido">
+            <a:extLst>
+              <a:ext uri="{FF2B5EF4-FFF2-40B4-BE49-F238E27FC236}">
+                <a16:creationId xmlns:a16="http://schemas.microsoft.com/office/drawing/2014/main" id="{C78BEB93-7603-7138-6844-F9B93A50E13E}"/>
+              </a:ext>
+            </a:extLst>
+          </p:cNvPr>
+          <p:cNvPicPr>
+            <a:picLocks noChangeAspect="1"/>
+          </p:cNvPicPr>
+          <p:nvPr/>
+        </p:nvPicPr>
+        <p:blipFill>
+          <a:blip r:embed="rId3">
+            <a:extLst>
+              <a:ext uri="{28A0092B-C50C-407E-A947-70E740481C1C}">
+                <a14:useLocalDpi xmlns:a14="http://schemas.microsoft.com/office/drawing/2010/main" val="0"/>
+              </a:ext>
+              <a:ext uri="{96DAC541-7B7A-43D3-8B79-37D633B846F1}">
+                <asvg:svgBlip xmlns:asvg="http://schemas.microsoft.com/office/drawing/2016/SVG/main" r:embed="rId4"/>
+              </a:ext>
+            </a:extLst>
+          </a:blip>
+          <a:stretch>
+            <a:fillRect/>
+          </a:stretch>
+        </p:blipFill>
+        <p:spPr>
+          <a:xfrm>
+            <a:off x="8895650" y="431033"/>
+            <a:ext cx="914400" cy="914400"/>
+          </a:xfrm>
+          <a:prstGeom prst="rect">
+            <a:avLst/>
+          </a:prstGeom>
+        </p:spPr>
+      </p:pic>
     </p:spTree>
     <p:extLst>
       <p:ext uri="{BB962C8B-B14F-4D97-AF65-F5344CB8AC3E}">
@@ -24102,7 +24165,7 @@
         <p:spPr>
           <a:xfrm>
             <a:off x="0" y="-1"/>
-            <a:ext cx="3308279" cy="523220"/>
+            <a:ext cx="3308279" cy="954107"/>
           </a:xfrm>
           <a:prstGeom prst="rect">
             <a:avLst/>
@@ -24133,7 +24196,7 @@
                   </a:schemeClr>
                 </a:solidFill>
               </a:rPr>
-              <a:t> (?)</a:t>
+              <a:t> (99999PZC00)</a:t>
             </a:r>
           </a:p>
         </p:txBody>
@@ -24501,7 +24564,7 @@
         <p:spPr>
           <a:xfrm>
             <a:off x="0" y="-1"/>
-            <a:ext cx="3308279" cy="523220"/>
+            <a:ext cx="3308279" cy="954107"/>
           </a:xfrm>
           <a:prstGeom prst="rect">
             <a:avLst/>
@@ -24532,7 +24595,7 @@
                   </a:schemeClr>
                 </a:solidFill>
               </a:rPr>
-              <a:t> (?)</a:t>
+              <a:t> (99999PZC00)</a:t>
             </a:r>
           </a:p>
         </p:txBody>
@@ -24738,6 +24801,45 @@
           </a:p>
         </p:txBody>
       </p:sp>
+      <p:pic>
+        <p:nvPicPr>
+          <p:cNvPr id="2" name="Gráfico 1" descr="Marca de verificación con relleno sólido">
+            <a:extLst>
+              <a:ext uri="{FF2B5EF4-FFF2-40B4-BE49-F238E27FC236}">
+                <a16:creationId xmlns:a16="http://schemas.microsoft.com/office/drawing/2014/main" id="{E493ED13-7524-F46B-4E04-5F7D46181757}"/>
+              </a:ext>
+            </a:extLst>
+          </p:cNvPr>
+          <p:cNvPicPr>
+            <a:picLocks noChangeAspect="1"/>
+          </p:cNvPicPr>
+          <p:nvPr/>
+        </p:nvPicPr>
+        <p:blipFill>
+          <a:blip r:embed="rId3">
+            <a:extLst>
+              <a:ext uri="{28A0092B-C50C-407E-A947-70E740481C1C}">
+                <a14:useLocalDpi xmlns:a14="http://schemas.microsoft.com/office/drawing/2010/main" val="0"/>
+              </a:ext>
+              <a:ext uri="{96DAC541-7B7A-43D3-8B79-37D633B846F1}">
+                <asvg:svgBlip xmlns:asvg="http://schemas.microsoft.com/office/drawing/2016/SVG/main" r:embed="rId4"/>
+              </a:ext>
+            </a:extLst>
+          </a:blip>
+          <a:stretch>
+            <a:fillRect/>
+          </a:stretch>
+        </p:blipFill>
+        <p:spPr>
+          <a:xfrm>
+            <a:off x="8895650" y="431033"/>
+            <a:ext cx="914400" cy="914400"/>
+          </a:xfrm>
+          <a:prstGeom prst="rect">
+            <a:avLst/>
+          </a:prstGeom>
+        </p:spPr>
+      </p:pic>
     </p:spTree>
     <p:extLst>
       <p:ext uri="{BB962C8B-B14F-4D97-AF65-F5344CB8AC3E}">

</xml_diff>